<commit_message>
Terminando aula 2 de POO
</commit_message>
<xml_diff>
--- a/Euripedes Simões de Paula/Java/Programação Orientada a Objetos 2/Programação Orientada a Objetos 2.pptx
+++ b/Euripedes Simões de Paula/Java/Programação Orientada a Objetos 2/Programação Orientada a Objetos 2.pptx
@@ -33,8 +33,14 @@
     <p:sldId id="283" r:id="rId27"/>
     <p:sldId id="284" r:id="rId28"/>
     <p:sldId id="285" r:id="rId29"/>
-    <p:sldId id="280" r:id="rId30"/>
-    <p:sldId id="259" r:id="rId31"/>
+    <p:sldId id="286" r:id="rId30"/>
+    <p:sldId id="287" r:id="rId31"/>
+    <p:sldId id="288" r:id="rId32"/>
+    <p:sldId id="289" r:id="rId33"/>
+    <p:sldId id="290" r:id="rId34"/>
+    <p:sldId id="291" r:id="rId35"/>
+    <p:sldId id="280" r:id="rId36"/>
+    <p:sldId id="259" r:id="rId37"/>
   </p:sldIdLst>
   <p:sldSz cx="12192000" cy="6858000"/>
   <p:notesSz cx="6858000" cy="9144000"/>
@@ -369,7 +375,7 @@
           <a:p>
             <a:fld id="{33F614C7-1985-416F-BC25-F02A921AA324}" type="datetimeFigureOut">
               <a:rPr lang="pt-BR" smtClean="0"/>
-              <a:t>30/04/2024</a:t>
+              <a:t>02/05/2024</a:t>
             </a:fld>
             <a:endParaRPr lang="pt-BR"/>
           </a:p>
@@ -577,7 +583,7 @@
           <a:p>
             <a:fld id="{33F614C7-1985-416F-BC25-F02A921AA324}" type="datetimeFigureOut">
               <a:rPr lang="pt-BR" smtClean="0"/>
-              <a:t>30/04/2024</a:t>
+              <a:t>02/05/2024</a:t>
             </a:fld>
             <a:endParaRPr lang="pt-BR"/>
           </a:p>
@@ -835,7 +841,7 @@
           <a:p>
             <a:fld id="{33F614C7-1985-416F-BC25-F02A921AA324}" type="datetimeFigureOut">
               <a:rPr lang="pt-BR" smtClean="0"/>
-              <a:t>30/04/2024</a:t>
+              <a:t>02/05/2024</a:t>
             </a:fld>
             <a:endParaRPr lang="pt-BR"/>
           </a:p>
@@ -1005,7 +1011,7 @@
           <a:p>
             <a:fld id="{33F614C7-1985-416F-BC25-F02A921AA324}" type="datetimeFigureOut">
               <a:rPr lang="pt-BR" smtClean="0"/>
-              <a:t>30/04/2024</a:t>
+              <a:t>02/05/2024</a:t>
             </a:fld>
             <a:endParaRPr lang="pt-BR"/>
           </a:p>
@@ -1342,7 +1348,7 @@
           <a:p>
             <a:fld id="{33F614C7-1985-416F-BC25-F02A921AA324}" type="datetimeFigureOut">
               <a:rPr lang="pt-BR" smtClean="0"/>
-              <a:t>30/04/2024</a:t>
+              <a:t>02/05/2024</a:t>
             </a:fld>
             <a:endParaRPr lang="pt-BR"/>
           </a:p>
@@ -1617,7 +1623,7 @@
           <a:p>
             <a:fld id="{33F614C7-1985-416F-BC25-F02A921AA324}" type="datetimeFigureOut">
               <a:rPr lang="pt-BR" smtClean="0"/>
-              <a:t>30/04/2024</a:t>
+              <a:t>02/05/2024</a:t>
             </a:fld>
             <a:endParaRPr lang="pt-BR"/>
           </a:p>
@@ -1996,7 +2002,7 @@
           <a:p>
             <a:fld id="{33F614C7-1985-416F-BC25-F02A921AA324}" type="datetimeFigureOut">
               <a:rPr lang="pt-BR" smtClean="0"/>
-              <a:t>30/04/2024</a:t>
+              <a:t>02/05/2024</a:t>
             </a:fld>
             <a:endParaRPr lang="pt-BR"/>
           </a:p>
@@ -2114,7 +2120,7 @@
           <a:p>
             <a:fld id="{33F614C7-1985-416F-BC25-F02A921AA324}" type="datetimeFigureOut">
               <a:rPr lang="pt-BR" smtClean="0"/>
-              <a:t>30/04/2024</a:t>
+              <a:t>02/05/2024</a:t>
             </a:fld>
             <a:endParaRPr lang="pt-BR"/>
           </a:p>
@@ -2287,7 +2293,7 @@
           <a:p>
             <a:fld id="{33F614C7-1985-416F-BC25-F02A921AA324}" type="datetimeFigureOut">
               <a:rPr lang="pt-BR" smtClean="0"/>
-              <a:t>30/04/2024</a:t>
+              <a:t>02/05/2024</a:t>
             </a:fld>
             <a:endParaRPr lang="pt-BR"/>
           </a:p>
@@ -2643,7 +2649,7 @@
           <a:p>
             <a:fld id="{33F614C7-1985-416F-BC25-F02A921AA324}" type="datetimeFigureOut">
               <a:rPr lang="pt-BR" smtClean="0"/>
-              <a:t>30/04/2024</a:t>
+              <a:t>02/05/2024</a:t>
             </a:fld>
             <a:endParaRPr lang="pt-BR"/>
           </a:p>
@@ -3022,7 +3028,7 @@
           <a:p>
             <a:fld id="{33F614C7-1985-416F-BC25-F02A921AA324}" type="datetimeFigureOut">
               <a:rPr lang="pt-BR" smtClean="0"/>
-              <a:t>30/04/2024</a:t>
+              <a:t>02/05/2024</a:t>
             </a:fld>
             <a:endParaRPr lang="pt-BR"/>
           </a:p>
@@ -3311,7 +3317,7 @@
           <a:p>
             <a:fld id="{33F614C7-1985-416F-BC25-F02A921AA324}" type="datetimeFigureOut">
               <a:rPr lang="pt-BR" smtClean="0"/>
-              <a:t>30/04/2024</a:t>
+              <a:t>02/05/2024</a:t>
             </a:fld>
             <a:endParaRPr lang="pt-BR"/>
           </a:p>
@@ -14985,6 +14991,12 @@
           <a:p>
             <a:r>
               <a:rPr lang="pt-BR" dirty="0"/>
+              <a:t>É uma maneira de criar o mesmo método de maneiras diferentes na mesma classe.</a:t>
+            </a:r>
+          </a:p>
+          <a:p>
+            <a:r>
+              <a:rPr lang="pt-BR" dirty="0"/>
               <a:t>Veja um exemplo no próximo slide.</a:t>
             </a:r>
           </a:p>
@@ -15723,119 +15735,19 @@
           <a:p>
             <a:r>
               <a:rPr lang="pt-BR" dirty="0"/>
-              <a:t> </a:t>
-            </a:r>
-            <a:r>
-              <a:rPr lang="pt-BR" dirty="0">
-                <a:solidFill>
-                  <a:srgbClr val="FF0000"/>
-                </a:solidFill>
-              </a:rPr>
-              <a:t>public</a:t>
-            </a:r>
-            <a:r>
-              <a:rPr lang="pt-BR" dirty="0"/>
-              <a:t> class Transporte {</a:t>
-            </a:r>
-          </a:p>
-          <a:p>
-            <a:r>
-              <a:rPr lang="pt-BR" dirty="0"/>
-              <a:t> 	</a:t>
-            </a:r>
-            <a:r>
-              <a:rPr lang="pt-BR" dirty="0">
-                <a:solidFill>
-                  <a:srgbClr val="FF0000"/>
-                </a:solidFill>
-              </a:rPr>
-              <a:t>private</a:t>
-            </a:r>
-            <a:r>
-              <a:rPr lang="pt-BR" dirty="0"/>
-              <a:t> int capacidade;</a:t>
-            </a:r>
-          </a:p>
-          <a:p>
-            <a:r>
-              <a:rPr lang="pt-BR" dirty="0"/>
-              <a:t> 	</a:t>
-            </a:r>
-            <a:r>
-              <a:rPr lang="pt-BR" dirty="0">
-                <a:solidFill>
-                  <a:srgbClr val="00B050"/>
-                </a:solidFill>
-              </a:rPr>
-              <a:t>/* Método Construtor com parâmetros  */</a:t>
-            </a:r>
-          </a:p>
-          <a:p>
-            <a:r>
-              <a:rPr lang="pt-BR" dirty="0"/>
-              <a:t> 	</a:t>
-            </a:r>
-            <a:r>
-              <a:rPr lang="pt-BR" dirty="0">
-                <a:solidFill>
-                  <a:srgbClr val="FF0000"/>
-                </a:solidFill>
-              </a:rPr>
-              <a:t>public</a:t>
-            </a:r>
-            <a:r>
-              <a:rPr lang="pt-BR" dirty="0"/>
-              <a:t> Transporte(int capacidade) {</a:t>
-            </a:r>
-          </a:p>
-          <a:p>
-            <a:r>
-              <a:rPr lang="pt-BR" dirty="0"/>
-              <a:t> 		this.capacidade = capacidade;</a:t>
-            </a:r>
-          </a:p>
-          <a:p>
-            <a:r>
-              <a:rPr lang="pt-BR" dirty="0"/>
-              <a:t> 	}</a:t>
-            </a:r>
-          </a:p>
-          <a:p>
-            <a:r>
-              <a:rPr lang="pt-BR" dirty="0"/>
-              <a:t> 	</a:t>
-            </a:r>
-            <a:r>
-              <a:rPr lang="pt-BR" dirty="0">
-                <a:solidFill>
-                  <a:srgbClr val="00B050"/>
-                </a:solidFill>
-              </a:rPr>
-              <a:t>/* Método Construtor sem parâmetro */</a:t>
-            </a:r>
-          </a:p>
-          <a:p>
-            <a:r>
-              <a:rPr lang="pt-BR" dirty="0"/>
-              <a:t> 	</a:t>
-            </a:r>
-            <a:r>
-              <a:rPr lang="pt-BR" dirty="0">
-                <a:solidFill>
-                  <a:srgbClr val="FF0000"/>
-                </a:solidFill>
-              </a:rPr>
-              <a:t>public</a:t>
-            </a:r>
-            <a:r>
-              <a:rPr lang="pt-BR" dirty="0"/>
-              <a:t> Transporte() { }</a:t>
-            </a:r>
-          </a:p>
-          <a:p>
-            <a:r>
-              <a:rPr lang="pt-BR" dirty="0"/>
-              <a:t>}</a:t>
+              <a:t>No exemplo ao lado temos dois Construtores que recebem o mesmo nome, onde apenas o primeiro tem parâmetro.</a:t>
+            </a:r>
+          </a:p>
+          <a:p>
+            <a:r>
+              <a:rPr lang="pt-BR" dirty="0"/>
+              <a:t>É comum uma classe ter maneiras diferentes de criar um objeto, e é ai que o polimorfismo de sobrecarga acontece, sobre os Métodos Construtores.</a:t>
+            </a:r>
+          </a:p>
+          <a:p>
+            <a:r>
+              <a:rPr lang="pt-BR" dirty="0"/>
+              <a:t>O programa recebe os valores nos parâmetros, e procura o método, e o invoca se o método for ideal.</a:t>
             </a:r>
           </a:p>
         </p:txBody>
@@ -15872,10 +15784,10 @@
       </p:grpSpPr>
       <p:sp>
         <p:nvSpPr>
-          <p:cNvPr id="2" name="Título 1">
+          <p:cNvPr id="4" name="Título 1">
             <a:extLst>
               <a:ext uri="{FF2B5EF4-FFF2-40B4-BE49-F238E27FC236}">
-                <a16:creationId xmlns:a16="http://schemas.microsoft.com/office/drawing/2014/main" id="{C918661C-2083-9C4D-73B7-20B768BAD7D9}"/>
+                <a16:creationId xmlns:a16="http://schemas.microsoft.com/office/drawing/2014/main" id="{6C39060B-FEF0-6AA5-65E9-39A732572625}"/>
               </a:ext>
             </a:extLst>
           </p:cNvPr>
@@ -15886,42 +15798,351 @@
             <p:ph type="title"/>
           </p:nvPr>
         </p:nvSpPr>
-        <p:spPr/>
+        <p:spPr>
+          <a:xfrm>
+            <a:off x="1096963" y="287338"/>
+            <a:ext cx="10058400" cy="1449387"/>
+          </a:xfrm>
+        </p:spPr>
         <p:txBody>
           <a:bodyPr/>
           <a:lstStyle/>
           <a:p>
             <a:r>
               <a:rPr lang="pt-BR" dirty="0"/>
-              <a:t>Atividade de Hoje</a:t>
-            </a:r>
+              <a:t>POLIMORFISMO</a:t>
+            </a:r>
+            <a:endParaRPr lang="pt-BR" sz="2400" dirty="0"/>
           </a:p>
         </p:txBody>
       </p:sp>
       <p:sp>
         <p:nvSpPr>
-          <p:cNvPr id="3" name="Espaço Reservado para Conteúdo 2">
+          <p:cNvPr id="31" name="Espaço Reservado para Conteúdo 2">
             <a:extLst>
               <a:ext uri="{FF2B5EF4-FFF2-40B4-BE49-F238E27FC236}">
-                <a16:creationId xmlns:a16="http://schemas.microsoft.com/office/drawing/2014/main" id="{AA97E504-545A-6B62-3668-64BBE4769FF6}"/>
+                <a16:creationId xmlns:a16="http://schemas.microsoft.com/office/drawing/2014/main" id="{D2061234-52CD-FFAB-42EF-8F3150325C73}"/>
               </a:ext>
             </a:extLst>
           </p:cNvPr>
-          <p:cNvSpPr>
-            <a:spLocks noGrp="1"/>
+          <p:cNvSpPr txBox="1">
+            <a:spLocks/>
           </p:cNvSpPr>
-          <p:nvPr>
-            <p:ph idx="1"/>
-          </p:nvPr>
+          <p:nvPr/>
         </p:nvSpPr>
-        <p:spPr/>
+        <p:spPr>
+          <a:xfrm>
+            <a:off x="1097279" y="1845734"/>
+            <a:ext cx="10058084" cy="4023360"/>
+          </a:xfrm>
+          <a:prstGeom prst="rect">
+            <a:avLst/>
+          </a:prstGeom>
+        </p:spPr>
         <p:txBody>
-          <a:bodyPr/>
-          <a:lstStyle/>
-          <a:p>
-            <a:r>
-              <a:rPr lang="pt-BR" dirty="0"/>
-              <a:t>Buscar exemplos de como implementar a Herança em Java.</a:t>
+          <a:bodyPr vert="horz" lIns="0" tIns="45720" rIns="0" bIns="45720" rtlCol="0">
+            <a:normAutofit/>
+          </a:bodyPr>
+          <a:lstStyle>
+            <a:lvl1pPr marL="91440" indent="-91440" algn="l" defTabSz="914400" rtl="0" eaLnBrk="1" latinLnBrk="0" hangingPunct="1">
+              <a:lnSpc>
+                <a:spcPct val="90000"/>
+              </a:lnSpc>
+              <a:spcBef>
+                <a:spcPts val="1200"/>
+              </a:spcBef>
+              <a:spcAft>
+                <a:spcPts val="200"/>
+              </a:spcAft>
+              <a:buClr>
+                <a:schemeClr val="accent1"/>
+              </a:buClr>
+              <a:buSzPct val="100000"/>
+              <a:buFont typeface="Calibri" panose="020F0502020204030204" pitchFamily="34" charset="0"/>
+              <a:buChar char=" "/>
+              <a:defRPr sz="2000" kern="1200">
+                <a:solidFill>
+                  <a:schemeClr val="tx1">
+                    <a:lumMod val="75000"/>
+                    <a:lumOff val="25000"/>
+                  </a:schemeClr>
+                </a:solidFill>
+                <a:latin typeface="+mn-lt"/>
+                <a:ea typeface="+mn-ea"/>
+                <a:cs typeface="+mn-cs"/>
+              </a:defRPr>
+            </a:lvl1pPr>
+            <a:lvl2pPr marL="384048" indent="-182880" algn="l" defTabSz="914400" rtl="0" eaLnBrk="1" latinLnBrk="0" hangingPunct="1">
+              <a:lnSpc>
+                <a:spcPct val="90000"/>
+              </a:lnSpc>
+              <a:spcBef>
+                <a:spcPts val="200"/>
+              </a:spcBef>
+              <a:spcAft>
+                <a:spcPts val="400"/>
+              </a:spcAft>
+              <a:buClr>
+                <a:schemeClr val="accent1"/>
+              </a:buClr>
+              <a:buFont typeface="Calibri" pitchFamily="34" charset="0"/>
+              <a:buChar char="◦"/>
+              <a:defRPr sz="1800" kern="1200">
+                <a:solidFill>
+                  <a:schemeClr val="tx1">
+                    <a:lumMod val="75000"/>
+                    <a:lumOff val="25000"/>
+                  </a:schemeClr>
+                </a:solidFill>
+                <a:latin typeface="+mn-lt"/>
+                <a:ea typeface="+mn-ea"/>
+                <a:cs typeface="+mn-cs"/>
+              </a:defRPr>
+            </a:lvl2pPr>
+            <a:lvl3pPr marL="566928" indent="-182880" algn="l" defTabSz="914400" rtl="0" eaLnBrk="1" latinLnBrk="0" hangingPunct="1">
+              <a:lnSpc>
+                <a:spcPct val="90000"/>
+              </a:lnSpc>
+              <a:spcBef>
+                <a:spcPts val="200"/>
+              </a:spcBef>
+              <a:spcAft>
+                <a:spcPts val="400"/>
+              </a:spcAft>
+              <a:buClr>
+                <a:schemeClr val="accent1"/>
+              </a:buClr>
+              <a:buFont typeface="Calibri" pitchFamily="34" charset="0"/>
+              <a:buChar char="◦"/>
+              <a:defRPr sz="1400" kern="1200">
+                <a:solidFill>
+                  <a:schemeClr val="tx1">
+                    <a:lumMod val="75000"/>
+                    <a:lumOff val="25000"/>
+                  </a:schemeClr>
+                </a:solidFill>
+                <a:latin typeface="+mn-lt"/>
+                <a:ea typeface="+mn-ea"/>
+                <a:cs typeface="+mn-cs"/>
+              </a:defRPr>
+            </a:lvl3pPr>
+            <a:lvl4pPr marL="749808" indent="-182880" algn="l" defTabSz="914400" rtl="0" eaLnBrk="1" latinLnBrk="0" hangingPunct="1">
+              <a:lnSpc>
+                <a:spcPct val="90000"/>
+              </a:lnSpc>
+              <a:spcBef>
+                <a:spcPts val="200"/>
+              </a:spcBef>
+              <a:spcAft>
+                <a:spcPts val="400"/>
+              </a:spcAft>
+              <a:buClr>
+                <a:schemeClr val="accent1"/>
+              </a:buClr>
+              <a:buFont typeface="Calibri" pitchFamily="34" charset="0"/>
+              <a:buChar char="◦"/>
+              <a:defRPr sz="1400" kern="1200">
+                <a:solidFill>
+                  <a:schemeClr val="tx1">
+                    <a:lumMod val="75000"/>
+                    <a:lumOff val="25000"/>
+                  </a:schemeClr>
+                </a:solidFill>
+                <a:latin typeface="+mn-lt"/>
+                <a:ea typeface="+mn-ea"/>
+                <a:cs typeface="+mn-cs"/>
+              </a:defRPr>
+            </a:lvl4pPr>
+            <a:lvl5pPr marL="932688" indent="-182880" algn="l" defTabSz="914400" rtl="0" eaLnBrk="1" latinLnBrk="0" hangingPunct="1">
+              <a:lnSpc>
+                <a:spcPct val="90000"/>
+              </a:lnSpc>
+              <a:spcBef>
+                <a:spcPts val="200"/>
+              </a:spcBef>
+              <a:spcAft>
+                <a:spcPts val="400"/>
+              </a:spcAft>
+              <a:buClr>
+                <a:schemeClr val="accent1"/>
+              </a:buClr>
+              <a:buFont typeface="Calibri" pitchFamily="34" charset="0"/>
+              <a:buChar char="◦"/>
+              <a:defRPr sz="1400" kern="1200">
+                <a:solidFill>
+                  <a:schemeClr val="tx1">
+                    <a:lumMod val="75000"/>
+                    <a:lumOff val="25000"/>
+                  </a:schemeClr>
+                </a:solidFill>
+                <a:latin typeface="+mn-lt"/>
+                <a:ea typeface="+mn-ea"/>
+                <a:cs typeface="+mn-cs"/>
+              </a:defRPr>
+            </a:lvl5pPr>
+            <a:lvl6pPr marL="1100000" indent="-228600" algn="l" defTabSz="914400" rtl="0" eaLnBrk="1" latinLnBrk="0" hangingPunct="1">
+              <a:lnSpc>
+                <a:spcPct val="90000"/>
+              </a:lnSpc>
+              <a:spcBef>
+                <a:spcPts val="200"/>
+              </a:spcBef>
+              <a:spcAft>
+                <a:spcPts val="400"/>
+              </a:spcAft>
+              <a:buClr>
+                <a:schemeClr val="accent1"/>
+              </a:buClr>
+              <a:buFont typeface="Calibri" pitchFamily="34" charset="0"/>
+              <a:buChar char="◦"/>
+              <a:defRPr sz="1400" kern="1200">
+                <a:solidFill>
+                  <a:schemeClr val="tx1">
+                    <a:lumMod val="75000"/>
+                    <a:lumOff val="25000"/>
+                  </a:schemeClr>
+                </a:solidFill>
+                <a:latin typeface="+mn-lt"/>
+                <a:ea typeface="+mn-ea"/>
+                <a:cs typeface="+mn-cs"/>
+              </a:defRPr>
+            </a:lvl6pPr>
+            <a:lvl7pPr marL="1300000" indent="-228600" algn="l" defTabSz="914400" rtl="0" eaLnBrk="1" latinLnBrk="0" hangingPunct="1">
+              <a:lnSpc>
+                <a:spcPct val="90000"/>
+              </a:lnSpc>
+              <a:spcBef>
+                <a:spcPts val="200"/>
+              </a:spcBef>
+              <a:spcAft>
+                <a:spcPts val="400"/>
+              </a:spcAft>
+              <a:buClr>
+                <a:schemeClr val="accent1"/>
+              </a:buClr>
+              <a:buFont typeface="Calibri" pitchFamily="34" charset="0"/>
+              <a:buChar char="◦"/>
+              <a:defRPr sz="1400" kern="1200">
+                <a:solidFill>
+                  <a:schemeClr val="tx1">
+                    <a:lumMod val="75000"/>
+                    <a:lumOff val="25000"/>
+                  </a:schemeClr>
+                </a:solidFill>
+                <a:latin typeface="+mn-lt"/>
+                <a:ea typeface="+mn-ea"/>
+                <a:cs typeface="+mn-cs"/>
+              </a:defRPr>
+            </a:lvl7pPr>
+            <a:lvl8pPr marL="1500000" indent="-228600" algn="l" defTabSz="914400" rtl="0" eaLnBrk="1" latinLnBrk="0" hangingPunct="1">
+              <a:lnSpc>
+                <a:spcPct val="90000"/>
+              </a:lnSpc>
+              <a:spcBef>
+                <a:spcPts val="200"/>
+              </a:spcBef>
+              <a:spcAft>
+                <a:spcPts val="400"/>
+              </a:spcAft>
+              <a:buClr>
+                <a:schemeClr val="accent1"/>
+              </a:buClr>
+              <a:buFont typeface="Calibri" pitchFamily="34" charset="0"/>
+              <a:buChar char="◦"/>
+              <a:defRPr sz="1400" kern="1200">
+                <a:solidFill>
+                  <a:schemeClr val="tx1">
+                    <a:lumMod val="75000"/>
+                    <a:lumOff val="25000"/>
+                  </a:schemeClr>
+                </a:solidFill>
+                <a:latin typeface="+mn-lt"/>
+                <a:ea typeface="+mn-ea"/>
+                <a:cs typeface="+mn-cs"/>
+              </a:defRPr>
+            </a:lvl8pPr>
+            <a:lvl9pPr marL="1700000" indent="-228600" algn="l" defTabSz="914400" rtl="0" eaLnBrk="1" latinLnBrk="0" hangingPunct="1">
+              <a:lnSpc>
+                <a:spcPct val="90000"/>
+              </a:lnSpc>
+              <a:spcBef>
+                <a:spcPts val="200"/>
+              </a:spcBef>
+              <a:spcAft>
+                <a:spcPts val="400"/>
+              </a:spcAft>
+              <a:buClr>
+                <a:schemeClr val="accent1"/>
+              </a:buClr>
+              <a:buFont typeface="Calibri" pitchFamily="34" charset="0"/>
+              <a:buChar char="◦"/>
+              <a:defRPr sz="1400" kern="1200">
+                <a:solidFill>
+                  <a:schemeClr val="tx1">
+                    <a:lumMod val="75000"/>
+                    <a:lumOff val="25000"/>
+                  </a:schemeClr>
+                </a:solidFill>
+                <a:latin typeface="+mn-lt"/>
+                <a:ea typeface="+mn-ea"/>
+                <a:cs typeface="+mn-cs"/>
+              </a:defRPr>
+            </a:lvl9pPr>
+          </a:lstStyle>
+          <a:p>
+            <a:r>
+              <a:rPr lang="pt-BR" dirty="0"/>
+              <a:t>O </a:t>
+            </a:r>
+            <a:r>
+              <a:rPr lang="pt-BR" b="1" dirty="0"/>
+              <a:t>Polimorfismo de Sobreposição</a:t>
+            </a:r>
+            <a:r>
+              <a:rPr lang="pt-BR" dirty="0"/>
+              <a:t> nos permite reescrever na </a:t>
+            </a:r>
+            <a:r>
+              <a:rPr lang="pt-BR" dirty="0" err="1"/>
+              <a:t>SubClasse</a:t>
+            </a:r>
+            <a:r>
+              <a:rPr lang="pt-BR" dirty="0"/>
+              <a:t> um método criado na </a:t>
+            </a:r>
+            <a:r>
+              <a:rPr lang="pt-BR" dirty="0" err="1"/>
+              <a:t>SuperClasse</a:t>
+            </a:r>
+            <a:r>
+              <a:rPr lang="pt-BR" dirty="0"/>
+              <a:t>. Contendo as mesma assinatura (nome e tipo) e o tipo de retorno do método criado anteriormente.</a:t>
+            </a:r>
+          </a:p>
+          <a:p>
+            <a:r>
+              <a:rPr lang="pt-BR" dirty="0"/>
+              <a:t>Diferente do Método de Sobrecarga, os Métodos Sobrecarregados permitem que os métodos coexistam com os mesmos nomes e com assinaturas diferentes na mesma classe.</a:t>
+            </a:r>
+          </a:p>
+          <a:p>
+            <a:r>
+              <a:rPr lang="pt-BR" dirty="0"/>
+              <a:t>A Sobrescrita está relacionada a Herança, e conseguimos especializar os métodos herdados da superclasse, alterando o comportamento na </a:t>
+            </a:r>
+            <a:r>
+              <a:rPr lang="pt-BR" dirty="0" err="1"/>
+              <a:t>suclasse</a:t>
+            </a:r>
+            <a:r>
+              <a:rPr lang="pt-BR" dirty="0"/>
+              <a:t>.</a:t>
+            </a:r>
+          </a:p>
+          <a:p>
+            <a:r>
+              <a:rPr lang="pt-BR" dirty="0"/>
+              <a:t> </a:t>
             </a:r>
           </a:p>
         </p:txBody>
@@ -15929,7 +16150,7 @@
     </p:spTree>
     <p:extLst>
       <p:ext uri="{BB962C8B-B14F-4D97-AF65-F5344CB8AC3E}">
-        <p14:creationId xmlns:p14="http://schemas.microsoft.com/office/powerpoint/2010/main" val="1728503806"/>
+        <p14:creationId xmlns:p14="http://schemas.microsoft.com/office/powerpoint/2010/main" val="1539016121"/>
       </p:ext>
     </p:extLst>
   </p:cSld>
@@ -16088,6 +16309,2854 @@
       </p:grpSpPr>
       <p:sp>
         <p:nvSpPr>
+          <p:cNvPr id="4" name="Título 1">
+            <a:extLst>
+              <a:ext uri="{FF2B5EF4-FFF2-40B4-BE49-F238E27FC236}">
+                <a16:creationId xmlns:a16="http://schemas.microsoft.com/office/drawing/2014/main" id="{6C39060B-FEF0-6AA5-65E9-39A732572625}"/>
+              </a:ext>
+            </a:extLst>
+          </p:cNvPr>
+          <p:cNvSpPr>
+            <a:spLocks noGrp="1"/>
+          </p:cNvSpPr>
+          <p:nvPr>
+            <p:ph type="title"/>
+          </p:nvPr>
+        </p:nvSpPr>
+        <p:spPr>
+          <a:xfrm>
+            <a:off x="1096963" y="287338"/>
+            <a:ext cx="10058400" cy="1449387"/>
+          </a:xfrm>
+        </p:spPr>
+        <p:txBody>
+          <a:bodyPr/>
+          <a:lstStyle/>
+          <a:p>
+            <a:r>
+              <a:rPr lang="pt-BR" dirty="0"/>
+              <a:t>POLIMORFISMO</a:t>
+            </a:r>
+            <a:endParaRPr lang="pt-BR" sz="2400" dirty="0"/>
+          </a:p>
+        </p:txBody>
+      </p:sp>
+      <p:sp>
+        <p:nvSpPr>
+          <p:cNvPr id="31" name="Espaço Reservado para Conteúdo 2">
+            <a:extLst>
+              <a:ext uri="{FF2B5EF4-FFF2-40B4-BE49-F238E27FC236}">
+                <a16:creationId xmlns:a16="http://schemas.microsoft.com/office/drawing/2014/main" id="{D2061234-52CD-FFAB-42EF-8F3150325C73}"/>
+              </a:ext>
+            </a:extLst>
+          </p:cNvPr>
+          <p:cNvSpPr txBox="1">
+            <a:spLocks/>
+          </p:cNvSpPr>
+          <p:nvPr/>
+        </p:nvSpPr>
+        <p:spPr>
+          <a:xfrm>
+            <a:off x="1097279" y="1845734"/>
+            <a:ext cx="10058084" cy="4023360"/>
+          </a:xfrm>
+          <a:prstGeom prst="rect">
+            <a:avLst/>
+          </a:prstGeom>
+        </p:spPr>
+        <p:txBody>
+          <a:bodyPr vert="horz" lIns="0" tIns="45720" rIns="0" bIns="45720" rtlCol="0">
+            <a:normAutofit lnSpcReduction="10000"/>
+          </a:bodyPr>
+          <a:lstStyle>
+            <a:lvl1pPr marL="91440" indent="-91440" algn="l" defTabSz="914400" rtl="0" eaLnBrk="1" latinLnBrk="0" hangingPunct="1">
+              <a:lnSpc>
+                <a:spcPct val="90000"/>
+              </a:lnSpc>
+              <a:spcBef>
+                <a:spcPts val="1200"/>
+              </a:spcBef>
+              <a:spcAft>
+                <a:spcPts val="200"/>
+              </a:spcAft>
+              <a:buClr>
+                <a:schemeClr val="accent1"/>
+              </a:buClr>
+              <a:buSzPct val="100000"/>
+              <a:buFont typeface="Calibri" panose="020F0502020204030204" pitchFamily="34" charset="0"/>
+              <a:buChar char=" "/>
+              <a:defRPr sz="2000" kern="1200">
+                <a:solidFill>
+                  <a:schemeClr val="tx1">
+                    <a:lumMod val="75000"/>
+                    <a:lumOff val="25000"/>
+                  </a:schemeClr>
+                </a:solidFill>
+                <a:latin typeface="+mn-lt"/>
+                <a:ea typeface="+mn-ea"/>
+                <a:cs typeface="+mn-cs"/>
+              </a:defRPr>
+            </a:lvl1pPr>
+            <a:lvl2pPr marL="384048" indent="-182880" algn="l" defTabSz="914400" rtl="0" eaLnBrk="1" latinLnBrk="0" hangingPunct="1">
+              <a:lnSpc>
+                <a:spcPct val="90000"/>
+              </a:lnSpc>
+              <a:spcBef>
+                <a:spcPts val="200"/>
+              </a:spcBef>
+              <a:spcAft>
+                <a:spcPts val="400"/>
+              </a:spcAft>
+              <a:buClr>
+                <a:schemeClr val="accent1"/>
+              </a:buClr>
+              <a:buFont typeface="Calibri" pitchFamily="34" charset="0"/>
+              <a:buChar char="◦"/>
+              <a:defRPr sz="1800" kern="1200">
+                <a:solidFill>
+                  <a:schemeClr val="tx1">
+                    <a:lumMod val="75000"/>
+                    <a:lumOff val="25000"/>
+                  </a:schemeClr>
+                </a:solidFill>
+                <a:latin typeface="+mn-lt"/>
+                <a:ea typeface="+mn-ea"/>
+                <a:cs typeface="+mn-cs"/>
+              </a:defRPr>
+            </a:lvl2pPr>
+            <a:lvl3pPr marL="566928" indent="-182880" algn="l" defTabSz="914400" rtl="0" eaLnBrk="1" latinLnBrk="0" hangingPunct="1">
+              <a:lnSpc>
+                <a:spcPct val="90000"/>
+              </a:lnSpc>
+              <a:spcBef>
+                <a:spcPts val="200"/>
+              </a:spcBef>
+              <a:spcAft>
+                <a:spcPts val="400"/>
+              </a:spcAft>
+              <a:buClr>
+                <a:schemeClr val="accent1"/>
+              </a:buClr>
+              <a:buFont typeface="Calibri" pitchFamily="34" charset="0"/>
+              <a:buChar char="◦"/>
+              <a:defRPr sz="1400" kern="1200">
+                <a:solidFill>
+                  <a:schemeClr val="tx1">
+                    <a:lumMod val="75000"/>
+                    <a:lumOff val="25000"/>
+                  </a:schemeClr>
+                </a:solidFill>
+                <a:latin typeface="+mn-lt"/>
+                <a:ea typeface="+mn-ea"/>
+                <a:cs typeface="+mn-cs"/>
+              </a:defRPr>
+            </a:lvl3pPr>
+            <a:lvl4pPr marL="749808" indent="-182880" algn="l" defTabSz="914400" rtl="0" eaLnBrk="1" latinLnBrk="0" hangingPunct="1">
+              <a:lnSpc>
+                <a:spcPct val="90000"/>
+              </a:lnSpc>
+              <a:spcBef>
+                <a:spcPts val="200"/>
+              </a:spcBef>
+              <a:spcAft>
+                <a:spcPts val="400"/>
+              </a:spcAft>
+              <a:buClr>
+                <a:schemeClr val="accent1"/>
+              </a:buClr>
+              <a:buFont typeface="Calibri" pitchFamily="34" charset="0"/>
+              <a:buChar char="◦"/>
+              <a:defRPr sz="1400" kern="1200">
+                <a:solidFill>
+                  <a:schemeClr val="tx1">
+                    <a:lumMod val="75000"/>
+                    <a:lumOff val="25000"/>
+                  </a:schemeClr>
+                </a:solidFill>
+                <a:latin typeface="+mn-lt"/>
+                <a:ea typeface="+mn-ea"/>
+                <a:cs typeface="+mn-cs"/>
+              </a:defRPr>
+            </a:lvl4pPr>
+            <a:lvl5pPr marL="932688" indent="-182880" algn="l" defTabSz="914400" rtl="0" eaLnBrk="1" latinLnBrk="0" hangingPunct="1">
+              <a:lnSpc>
+                <a:spcPct val="90000"/>
+              </a:lnSpc>
+              <a:spcBef>
+                <a:spcPts val="200"/>
+              </a:spcBef>
+              <a:spcAft>
+                <a:spcPts val="400"/>
+              </a:spcAft>
+              <a:buClr>
+                <a:schemeClr val="accent1"/>
+              </a:buClr>
+              <a:buFont typeface="Calibri" pitchFamily="34" charset="0"/>
+              <a:buChar char="◦"/>
+              <a:defRPr sz="1400" kern="1200">
+                <a:solidFill>
+                  <a:schemeClr val="tx1">
+                    <a:lumMod val="75000"/>
+                    <a:lumOff val="25000"/>
+                  </a:schemeClr>
+                </a:solidFill>
+                <a:latin typeface="+mn-lt"/>
+                <a:ea typeface="+mn-ea"/>
+                <a:cs typeface="+mn-cs"/>
+              </a:defRPr>
+            </a:lvl5pPr>
+            <a:lvl6pPr marL="1100000" indent="-228600" algn="l" defTabSz="914400" rtl="0" eaLnBrk="1" latinLnBrk="0" hangingPunct="1">
+              <a:lnSpc>
+                <a:spcPct val="90000"/>
+              </a:lnSpc>
+              <a:spcBef>
+                <a:spcPts val="200"/>
+              </a:spcBef>
+              <a:spcAft>
+                <a:spcPts val="400"/>
+              </a:spcAft>
+              <a:buClr>
+                <a:schemeClr val="accent1"/>
+              </a:buClr>
+              <a:buFont typeface="Calibri" pitchFamily="34" charset="0"/>
+              <a:buChar char="◦"/>
+              <a:defRPr sz="1400" kern="1200">
+                <a:solidFill>
+                  <a:schemeClr val="tx1">
+                    <a:lumMod val="75000"/>
+                    <a:lumOff val="25000"/>
+                  </a:schemeClr>
+                </a:solidFill>
+                <a:latin typeface="+mn-lt"/>
+                <a:ea typeface="+mn-ea"/>
+                <a:cs typeface="+mn-cs"/>
+              </a:defRPr>
+            </a:lvl6pPr>
+            <a:lvl7pPr marL="1300000" indent="-228600" algn="l" defTabSz="914400" rtl="0" eaLnBrk="1" latinLnBrk="0" hangingPunct="1">
+              <a:lnSpc>
+                <a:spcPct val="90000"/>
+              </a:lnSpc>
+              <a:spcBef>
+                <a:spcPts val="200"/>
+              </a:spcBef>
+              <a:spcAft>
+                <a:spcPts val="400"/>
+              </a:spcAft>
+              <a:buClr>
+                <a:schemeClr val="accent1"/>
+              </a:buClr>
+              <a:buFont typeface="Calibri" pitchFamily="34" charset="0"/>
+              <a:buChar char="◦"/>
+              <a:defRPr sz="1400" kern="1200">
+                <a:solidFill>
+                  <a:schemeClr val="tx1">
+                    <a:lumMod val="75000"/>
+                    <a:lumOff val="25000"/>
+                  </a:schemeClr>
+                </a:solidFill>
+                <a:latin typeface="+mn-lt"/>
+                <a:ea typeface="+mn-ea"/>
+                <a:cs typeface="+mn-cs"/>
+              </a:defRPr>
+            </a:lvl7pPr>
+            <a:lvl8pPr marL="1500000" indent="-228600" algn="l" defTabSz="914400" rtl="0" eaLnBrk="1" latinLnBrk="0" hangingPunct="1">
+              <a:lnSpc>
+                <a:spcPct val="90000"/>
+              </a:lnSpc>
+              <a:spcBef>
+                <a:spcPts val="200"/>
+              </a:spcBef>
+              <a:spcAft>
+                <a:spcPts val="400"/>
+              </a:spcAft>
+              <a:buClr>
+                <a:schemeClr val="accent1"/>
+              </a:buClr>
+              <a:buFont typeface="Calibri" pitchFamily="34" charset="0"/>
+              <a:buChar char="◦"/>
+              <a:defRPr sz="1400" kern="1200">
+                <a:solidFill>
+                  <a:schemeClr val="tx1">
+                    <a:lumMod val="75000"/>
+                    <a:lumOff val="25000"/>
+                  </a:schemeClr>
+                </a:solidFill>
+                <a:latin typeface="+mn-lt"/>
+                <a:ea typeface="+mn-ea"/>
+                <a:cs typeface="+mn-cs"/>
+              </a:defRPr>
+            </a:lvl8pPr>
+            <a:lvl9pPr marL="1700000" indent="-228600" algn="l" defTabSz="914400" rtl="0" eaLnBrk="1" latinLnBrk="0" hangingPunct="1">
+              <a:lnSpc>
+                <a:spcPct val="90000"/>
+              </a:lnSpc>
+              <a:spcBef>
+                <a:spcPts val="200"/>
+              </a:spcBef>
+              <a:spcAft>
+                <a:spcPts val="400"/>
+              </a:spcAft>
+              <a:buClr>
+                <a:schemeClr val="accent1"/>
+              </a:buClr>
+              <a:buFont typeface="Calibri" pitchFamily="34" charset="0"/>
+              <a:buChar char="◦"/>
+              <a:defRPr sz="1400" kern="1200">
+                <a:solidFill>
+                  <a:schemeClr val="tx1">
+                    <a:lumMod val="75000"/>
+                    <a:lumOff val="25000"/>
+                  </a:schemeClr>
+                </a:solidFill>
+                <a:latin typeface="+mn-lt"/>
+                <a:ea typeface="+mn-ea"/>
+                <a:cs typeface="+mn-cs"/>
+              </a:defRPr>
+            </a:lvl9pPr>
+          </a:lstStyle>
+          <a:p>
+            <a:r>
+              <a:rPr lang="pt-BR" dirty="0"/>
+              <a:t>Aqui temos um exemplo de sobrescrita, onde o Método </a:t>
+            </a:r>
+            <a:r>
+              <a:rPr lang="pt-BR" i="1" dirty="0"/>
+              <a:t>visualizar()</a:t>
+            </a:r>
+            <a:r>
+              <a:rPr lang="pt-BR" dirty="0"/>
+              <a:t> na Classe Transporte está sendo implementado:</a:t>
+            </a:r>
+          </a:p>
+          <a:p>
+            <a:r>
+              <a:rPr lang="pt-BR" dirty="0">
+                <a:solidFill>
+                  <a:srgbClr val="FF0000"/>
+                </a:solidFill>
+              </a:rPr>
+              <a:t>public</a:t>
+            </a:r>
+            <a:r>
+              <a:rPr lang="pt-BR" dirty="0"/>
+              <a:t> void visualizar() {</a:t>
+            </a:r>
+          </a:p>
+          <a:p>
+            <a:r>
+              <a:rPr lang="pt-BR" dirty="0"/>
+              <a:t> 	 </a:t>
+            </a:r>
+            <a:r>
+              <a:rPr lang="pt-BR" dirty="0" err="1"/>
+              <a:t>System.out.printIn</a:t>
+            </a:r>
+            <a:r>
+              <a:rPr lang="pt-BR" dirty="0"/>
+              <a:t>(</a:t>
+            </a:r>
+            <a:r>
+              <a:rPr lang="pt-BR" dirty="0">
+                <a:solidFill>
+                  <a:srgbClr val="0070C0"/>
+                </a:solidFill>
+              </a:rPr>
+              <a:t>“\n\n*************************************************”</a:t>
+            </a:r>
+            <a:r>
+              <a:rPr lang="pt-BR" dirty="0"/>
+              <a:t>);</a:t>
+            </a:r>
+          </a:p>
+          <a:p>
+            <a:r>
+              <a:rPr lang="pt-BR" dirty="0"/>
+              <a:t> 	 </a:t>
+            </a:r>
+            <a:r>
+              <a:rPr lang="pt-BR" dirty="0" err="1"/>
+              <a:t>System.out.</a:t>
+            </a:r>
+            <a:r>
+              <a:rPr lang="pt-BR" dirty="0" err="1">
+                <a:solidFill>
+                  <a:srgbClr val="7030A0"/>
+                </a:solidFill>
+              </a:rPr>
+              <a:t>printIn</a:t>
+            </a:r>
+            <a:r>
+              <a:rPr lang="pt-BR" dirty="0">
+                <a:solidFill>
+                  <a:srgbClr val="0070C0"/>
+                </a:solidFill>
+              </a:rPr>
+              <a:t>(“Dados do Meio de Transporte:”</a:t>
+            </a:r>
+            <a:r>
+              <a:rPr lang="pt-BR" dirty="0"/>
+              <a:t>);</a:t>
+            </a:r>
+          </a:p>
+          <a:p>
+            <a:r>
+              <a:rPr lang="pt-BR" dirty="0"/>
+              <a:t> 	 </a:t>
+            </a:r>
+            <a:r>
+              <a:rPr lang="pt-BR" dirty="0" err="1"/>
+              <a:t>System.out.printIn</a:t>
+            </a:r>
+            <a:r>
+              <a:rPr lang="pt-BR" dirty="0"/>
+              <a:t>(</a:t>
+            </a:r>
+            <a:r>
+              <a:rPr lang="pt-BR" dirty="0">
+                <a:solidFill>
+                  <a:srgbClr val="0070C0"/>
+                </a:solidFill>
+              </a:rPr>
+              <a:t>“*****************************************************”</a:t>
+            </a:r>
+            <a:r>
+              <a:rPr lang="pt-BR" dirty="0"/>
+              <a:t>);</a:t>
+            </a:r>
+          </a:p>
+          <a:p>
+            <a:r>
+              <a:rPr lang="pt-BR" dirty="0"/>
+              <a:t> 	 </a:t>
+            </a:r>
+            <a:r>
+              <a:rPr lang="pt-BR" dirty="0" err="1"/>
+              <a:t>System.out.</a:t>
+            </a:r>
+            <a:r>
+              <a:rPr lang="pt-BR" dirty="0" err="1">
+                <a:solidFill>
+                  <a:srgbClr val="7030A0"/>
+                </a:solidFill>
+              </a:rPr>
+              <a:t>printIn</a:t>
+            </a:r>
+            <a:r>
+              <a:rPr lang="pt-BR" dirty="0">
+                <a:solidFill>
+                  <a:srgbClr val="0070C0"/>
+                </a:solidFill>
+              </a:rPr>
+              <a:t>(“Capacidade (Nº de passageiros): “ </a:t>
+            </a:r>
+            <a:r>
+              <a:rPr lang="pt-BR" dirty="0"/>
+              <a:t>+ </a:t>
+            </a:r>
+            <a:r>
+              <a:rPr lang="pt-BR" dirty="0" err="1"/>
+              <a:t>this.capacidade</a:t>
+            </a:r>
+            <a:r>
+              <a:rPr lang="pt-BR" dirty="0"/>
+              <a:t> );</a:t>
+            </a:r>
+          </a:p>
+          <a:p>
+            <a:r>
+              <a:rPr lang="pt-BR" dirty="0"/>
+              <a:t>} </a:t>
+            </a:r>
+            <a:endParaRPr lang="pt-BR" i="1" dirty="0"/>
+          </a:p>
+          <a:p>
+            <a:endParaRPr lang="pt-BR" dirty="0"/>
+          </a:p>
+          <a:p>
+            <a:r>
+              <a:rPr lang="pt-BR" dirty="0"/>
+              <a:t> </a:t>
+            </a:r>
+          </a:p>
+        </p:txBody>
+      </p:sp>
+    </p:spTree>
+    <p:extLst>
+      <p:ext uri="{BB962C8B-B14F-4D97-AF65-F5344CB8AC3E}">
+        <p14:creationId xmlns:p14="http://schemas.microsoft.com/office/powerpoint/2010/main" val="169967901"/>
+      </p:ext>
+    </p:extLst>
+  </p:cSld>
+  <p:clrMapOvr>
+    <a:masterClrMapping/>
+  </p:clrMapOvr>
+</p:sld>
+</file>
+
+<file path=ppt/slides/slide31.xml><?xml version="1.0" encoding="utf-8"?>
+<p:sld xmlns:a="http://schemas.openxmlformats.org/drawingml/2006/main" xmlns:r="http://schemas.openxmlformats.org/officeDocument/2006/relationships" xmlns:p="http://schemas.openxmlformats.org/presentationml/2006/main">
+  <p:cSld>
+    <p:spTree>
+      <p:nvGrpSpPr>
+        <p:cNvPr id="1" name=""/>
+        <p:cNvGrpSpPr/>
+        <p:nvPr/>
+      </p:nvGrpSpPr>
+      <p:grpSpPr>
+        <a:xfrm>
+          <a:off x="0" y="0"/>
+          <a:ext cx="0" cy="0"/>
+          <a:chOff x="0" y="0"/>
+          <a:chExt cx="0" cy="0"/>
+        </a:xfrm>
+      </p:grpSpPr>
+      <p:sp>
+        <p:nvSpPr>
+          <p:cNvPr id="4" name="Título 1">
+            <a:extLst>
+              <a:ext uri="{FF2B5EF4-FFF2-40B4-BE49-F238E27FC236}">
+                <a16:creationId xmlns:a16="http://schemas.microsoft.com/office/drawing/2014/main" id="{6C39060B-FEF0-6AA5-65E9-39A732572625}"/>
+              </a:ext>
+            </a:extLst>
+          </p:cNvPr>
+          <p:cNvSpPr>
+            <a:spLocks noGrp="1"/>
+          </p:cNvSpPr>
+          <p:nvPr>
+            <p:ph type="title"/>
+          </p:nvPr>
+        </p:nvSpPr>
+        <p:spPr>
+          <a:xfrm>
+            <a:off x="1096963" y="287338"/>
+            <a:ext cx="10058400" cy="1449387"/>
+          </a:xfrm>
+        </p:spPr>
+        <p:txBody>
+          <a:bodyPr/>
+          <a:lstStyle/>
+          <a:p>
+            <a:r>
+              <a:rPr lang="pt-BR" dirty="0"/>
+              <a:t>POLIMORFISMO</a:t>
+            </a:r>
+            <a:endParaRPr lang="pt-BR" sz="2400" dirty="0"/>
+          </a:p>
+        </p:txBody>
+      </p:sp>
+      <p:sp>
+        <p:nvSpPr>
+          <p:cNvPr id="31" name="Espaço Reservado para Conteúdo 2">
+            <a:extLst>
+              <a:ext uri="{FF2B5EF4-FFF2-40B4-BE49-F238E27FC236}">
+                <a16:creationId xmlns:a16="http://schemas.microsoft.com/office/drawing/2014/main" id="{D2061234-52CD-FFAB-42EF-8F3150325C73}"/>
+              </a:ext>
+            </a:extLst>
+          </p:cNvPr>
+          <p:cNvSpPr txBox="1">
+            <a:spLocks/>
+          </p:cNvSpPr>
+          <p:nvPr/>
+        </p:nvSpPr>
+        <p:spPr>
+          <a:xfrm>
+            <a:off x="1097279" y="1845734"/>
+            <a:ext cx="10058084" cy="4023360"/>
+          </a:xfrm>
+          <a:prstGeom prst="rect">
+            <a:avLst/>
+          </a:prstGeom>
+        </p:spPr>
+        <p:txBody>
+          <a:bodyPr vert="horz" lIns="0" tIns="45720" rIns="0" bIns="45720" rtlCol="0">
+            <a:normAutofit lnSpcReduction="10000"/>
+          </a:bodyPr>
+          <a:lstStyle>
+            <a:lvl1pPr marL="91440" indent="-91440" algn="l" defTabSz="914400" rtl="0" eaLnBrk="1" latinLnBrk="0" hangingPunct="1">
+              <a:lnSpc>
+                <a:spcPct val="90000"/>
+              </a:lnSpc>
+              <a:spcBef>
+                <a:spcPts val="1200"/>
+              </a:spcBef>
+              <a:spcAft>
+                <a:spcPts val="200"/>
+              </a:spcAft>
+              <a:buClr>
+                <a:schemeClr val="accent1"/>
+              </a:buClr>
+              <a:buSzPct val="100000"/>
+              <a:buFont typeface="Calibri" panose="020F0502020204030204" pitchFamily="34" charset="0"/>
+              <a:buChar char=" "/>
+              <a:defRPr sz="2000" kern="1200">
+                <a:solidFill>
+                  <a:schemeClr val="tx1">
+                    <a:lumMod val="75000"/>
+                    <a:lumOff val="25000"/>
+                  </a:schemeClr>
+                </a:solidFill>
+                <a:latin typeface="+mn-lt"/>
+                <a:ea typeface="+mn-ea"/>
+                <a:cs typeface="+mn-cs"/>
+              </a:defRPr>
+            </a:lvl1pPr>
+            <a:lvl2pPr marL="384048" indent="-182880" algn="l" defTabSz="914400" rtl="0" eaLnBrk="1" latinLnBrk="0" hangingPunct="1">
+              <a:lnSpc>
+                <a:spcPct val="90000"/>
+              </a:lnSpc>
+              <a:spcBef>
+                <a:spcPts val="200"/>
+              </a:spcBef>
+              <a:spcAft>
+                <a:spcPts val="400"/>
+              </a:spcAft>
+              <a:buClr>
+                <a:schemeClr val="accent1"/>
+              </a:buClr>
+              <a:buFont typeface="Calibri" pitchFamily="34" charset="0"/>
+              <a:buChar char="◦"/>
+              <a:defRPr sz="1800" kern="1200">
+                <a:solidFill>
+                  <a:schemeClr val="tx1">
+                    <a:lumMod val="75000"/>
+                    <a:lumOff val="25000"/>
+                  </a:schemeClr>
+                </a:solidFill>
+                <a:latin typeface="+mn-lt"/>
+                <a:ea typeface="+mn-ea"/>
+                <a:cs typeface="+mn-cs"/>
+              </a:defRPr>
+            </a:lvl2pPr>
+            <a:lvl3pPr marL="566928" indent="-182880" algn="l" defTabSz="914400" rtl="0" eaLnBrk="1" latinLnBrk="0" hangingPunct="1">
+              <a:lnSpc>
+                <a:spcPct val="90000"/>
+              </a:lnSpc>
+              <a:spcBef>
+                <a:spcPts val="200"/>
+              </a:spcBef>
+              <a:spcAft>
+                <a:spcPts val="400"/>
+              </a:spcAft>
+              <a:buClr>
+                <a:schemeClr val="accent1"/>
+              </a:buClr>
+              <a:buFont typeface="Calibri" pitchFamily="34" charset="0"/>
+              <a:buChar char="◦"/>
+              <a:defRPr sz="1400" kern="1200">
+                <a:solidFill>
+                  <a:schemeClr val="tx1">
+                    <a:lumMod val="75000"/>
+                    <a:lumOff val="25000"/>
+                  </a:schemeClr>
+                </a:solidFill>
+                <a:latin typeface="+mn-lt"/>
+                <a:ea typeface="+mn-ea"/>
+                <a:cs typeface="+mn-cs"/>
+              </a:defRPr>
+            </a:lvl3pPr>
+            <a:lvl4pPr marL="749808" indent="-182880" algn="l" defTabSz="914400" rtl="0" eaLnBrk="1" latinLnBrk="0" hangingPunct="1">
+              <a:lnSpc>
+                <a:spcPct val="90000"/>
+              </a:lnSpc>
+              <a:spcBef>
+                <a:spcPts val="200"/>
+              </a:spcBef>
+              <a:spcAft>
+                <a:spcPts val="400"/>
+              </a:spcAft>
+              <a:buClr>
+                <a:schemeClr val="accent1"/>
+              </a:buClr>
+              <a:buFont typeface="Calibri" pitchFamily="34" charset="0"/>
+              <a:buChar char="◦"/>
+              <a:defRPr sz="1400" kern="1200">
+                <a:solidFill>
+                  <a:schemeClr val="tx1">
+                    <a:lumMod val="75000"/>
+                    <a:lumOff val="25000"/>
+                  </a:schemeClr>
+                </a:solidFill>
+                <a:latin typeface="+mn-lt"/>
+                <a:ea typeface="+mn-ea"/>
+                <a:cs typeface="+mn-cs"/>
+              </a:defRPr>
+            </a:lvl4pPr>
+            <a:lvl5pPr marL="932688" indent="-182880" algn="l" defTabSz="914400" rtl="0" eaLnBrk="1" latinLnBrk="0" hangingPunct="1">
+              <a:lnSpc>
+                <a:spcPct val="90000"/>
+              </a:lnSpc>
+              <a:spcBef>
+                <a:spcPts val="200"/>
+              </a:spcBef>
+              <a:spcAft>
+                <a:spcPts val="400"/>
+              </a:spcAft>
+              <a:buClr>
+                <a:schemeClr val="accent1"/>
+              </a:buClr>
+              <a:buFont typeface="Calibri" pitchFamily="34" charset="0"/>
+              <a:buChar char="◦"/>
+              <a:defRPr sz="1400" kern="1200">
+                <a:solidFill>
+                  <a:schemeClr val="tx1">
+                    <a:lumMod val="75000"/>
+                    <a:lumOff val="25000"/>
+                  </a:schemeClr>
+                </a:solidFill>
+                <a:latin typeface="+mn-lt"/>
+                <a:ea typeface="+mn-ea"/>
+                <a:cs typeface="+mn-cs"/>
+              </a:defRPr>
+            </a:lvl5pPr>
+            <a:lvl6pPr marL="1100000" indent="-228600" algn="l" defTabSz="914400" rtl="0" eaLnBrk="1" latinLnBrk="0" hangingPunct="1">
+              <a:lnSpc>
+                <a:spcPct val="90000"/>
+              </a:lnSpc>
+              <a:spcBef>
+                <a:spcPts val="200"/>
+              </a:spcBef>
+              <a:spcAft>
+                <a:spcPts val="400"/>
+              </a:spcAft>
+              <a:buClr>
+                <a:schemeClr val="accent1"/>
+              </a:buClr>
+              <a:buFont typeface="Calibri" pitchFamily="34" charset="0"/>
+              <a:buChar char="◦"/>
+              <a:defRPr sz="1400" kern="1200">
+                <a:solidFill>
+                  <a:schemeClr val="tx1">
+                    <a:lumMod val="75000"/>
+                    <a:lumOff val="25000"/>
+                  </a:schemeClr>
+                </a:solidFill>
+                <a:latin typeface="+mn-lt"/>
+                <a:ea typeface="+mn-ea"/>
+                <a:cs typeface="+mn-cs"/>
+              </a:defRPr>
+            </a:lvl6pPr>
+            <a:lvl7pPr marL="1300000" indent="-228600" algn="l" defTabSz="914400" rtl="0" eaLnBrk="1" latinLnBrk="0" hangingPunct="1">
+              <a:lnSpc>
+                <a:spcPct val="90000"/>
+              </a:lnSpc>
+              <a:spcBef>
+                <a:spcPts val="200"/>
+              </a:spcBef>
+              <a:spcAft>
+                <a:spcPts val="400"/>
+              </a:spcAft>
+              <a:buClr>
+                <a:schemeClr val="accent1"/>
+              </a:buClr>
+              <a:buFont typeface="Calibri" pitchFamily="34" charset="0"/>
+              <a:buChar char="◦"/>
+              <a:defRPr sz="1400" kern="1200">
+                <a:solidFill>
+                  <a:schemeClr val="tx1">
+                    <a:lumMod val="75000"/>
+                    <a:lumOff val="25000"/>
+                  </a:schemeClr>
+                </a:solidFill>
+                <a:latin typeface="+mn-lt"/>
+                <a:ea typeface="+mn-ea"/>
+                <a:cs typeface="+mn-cs"/>
+              </a:defRPr>
+            </a:lvl7pPr>
+            <a:lvl8pPr marL="1500000" indent="-228600" algn="l" defTabSz="914400" rtl="0" eaLnBrk="1" latinLnBrk="0" hangingPunct="1">
+              <a:lnSpc>
+                <a:spcPct val="90000"/>
+              </a:lnSpc>
+              <a:spcBef>
+                <a:spcPts val="200"/>
+              </a:spcBef>
+              <a:spcAft>
+                <a:spcPts val="400"/>
+              </a:spcAft>
+              <a:buClr>
+                <a:schemeClr val="accent1"/>
+              </a:buClr>
+              <a:buFont typeface="Calibri" pitchFamily="34" charset="0"/>
+              <a:buChar char="◦"/>
+              <a:defRPr sz="1400" kern="1200">
+                <a:solidFill>
+                  <a:schemeClr val="tx1">
+                    <a:lumMod val="75000"/>
+                    <a:lumOff val="25000"/>
+                  </a:schemeClr>
+                </a:solidFill>
+                <a:latin typeface="+mn-lt"/>
+                <a:ea typeface="+mn-ea"/>
+                <a:cs typeface="+mn-cs"/>
+              </a:defRPr>
+            </a:lvl8pPr>
+            <a:lvl9pPr marL="1700000" indent="-228600" algn="l" defTabSz="914400" rtl="0" eaLnBrk="1" latinLnBrk="0" hangingPunct="1">
+              <a:lnSpc>
+                <a:spcPct val="90000"/>
+              </a:lnSpc>
+              <a:spcBef>
+                <a:spcPts val="200"/>
+              </a:spcBef>
+              <a:spcAft>
+                <a:spcPts val="400"/>
+              </a:spcAft>
+              <a:buClr>
+                <a:schemeClr val="accent1"/>
+              </a:buClr>
+              <a:buFont typeface="Calibri" pitchFamily="34" charset="0"/>
+              <a:buChar char="◦"/>
+              <a:defRPr sz="1400" kern="1200">
+                <a:solidFill>
+                  <a:schemeClr val="tx1">
+                    <a:lumMod val="75000"/>
+                    <a:lumOff val="25000"/>
+                  </a:schemeClr>
+                </a:solidFill>
+                <a:latin typeface="+mn-lt"/>
+                <a:ea typeface="+mn-ea"/>
+                <a:cs typeface="+mn-cs"/>
+              </a:defRPr>
+            </a:lvl9pPr>
+          </a:lstStyle>
+          <a:p>
+            <a:r>
+              <a:rPr lang="pt-BR" dirty="0"/>
+              <a:t>Aqui temos um exemplo de sobrescrita, onde o Método </a:t>
+            </a:r>
+            <a:r>
+              <a:rPr lang="pt-BR" i="1" dirty="0"/>
+              <a:t>visualizar()</a:t>
+            </a:r>
+            <a:r>
+              <a:rPr lang="pt-BR" dirty="0"/>
+              <a:t> na Classe Terrestre está sendo implementado:</a:t>
+            </a:r>
+          </a:p>
+          <a:p>
+            <a:r>
+              <a:rPr lang="pt-BR" dirty="0">
+                <a:solidFill>
+                  <a:srgbClr val="0070C0"/>
+                </a:solidFill>
+              </a:rPr>
+              <a:t>@Override</a:t>
+            </a:r>
+          </a:p>
+          <a:p>
+            <a:r>
+              <a:rPr lang="pt-BR" dirty="0">
+                <a:solidFill>
+                  <a:srgbClr val="FF0000"/>
+                </a:solidFill>
+              </a:rPr>
+              <a:t>public</a:t>
+            </a:r>
+            <a:r>
+              <a:rPr lang="pt-BR" dirty="0"/>
+              <a:t> void visualizar() {</a:t>
+            </a:r>
+          </a:p>
+          <a:p>
+            <a:r>
+              <a:rPr lang="pt-BR" dirty="0"/>
+              <a:t> 	 </a:t>
+            </a:r>
+            <a:r>
+              <a:rPr lang="pt-BR" dirty="0" err="1">
+                <a:solidFill>
+                  <a:srgbClr val="7030A0"/>
+                </a:solidFill>
+              </a:rPr>
+              <a:t>super.visualizar</a:t>
+            </a:r>
+            <a:r>
+              <a:rPr lang="pt-BR" dirty="0">
+                <a:solidFill>
+                  <a:srgbClr val="7030A0"/>
+                </a:solidFill>
+              </a:rPr>
+              <a:t>();</a:t>
+            </a:r>
+          </a:p>
+          <a:p>
+            <a:r>
+              <a:rPr lang="pt-BR" dirty="0"/>
+              <a:t> 	 </a:t>
+            </a:r>
+            <a:r>
+              <a:rPr lang="pt-BR" dirty="0" err="1"/>
+              <a:t>System.out.</a:t>
+            </a:r>
+            <a:r>
+              <a:rPr lang="pt-BR" dirty="0" err="1">
+                <a:solidFill>
+                  <a:srgbClr val="7030A0"/>
+                </a:solidFill>
+              </a:rPr>
+              <a:t>printIn</a:t>
+            </a:r>
+            <a:r>
+              <a:rPr lang="pt-BR" dirty="0">
+                <a:solidFill>
+                  <a:srgbClr val="0070C0"/>
+                </a:solidFill>
+              </a:rPr>
+              <a:t>(“Número de rodas: ”</a:t>
+            </a:r>
+            <a:r>
+              <a:rPr lang="pt-BR" dirty="0">
+                <a:solidFill>
+                  <a:schemeClr val="bg2">
+                    <a:lumMod val="25000"/>
+                  </a:schemeClr>
+                </a:solidFill>
+              </a:rPr>
+              <a:t> </a:t>
+            </a:r>
+            <a:r>
+              <a:rPr lang="pt-BR" dirty="0"/>
+              <a:t>+ </a:t>
+            </a:r>
+            <a:r>
+              <a:rPr lang="pt-BR" dirty="0" err="1"/>
+              <a:t>this.numeroRodas</a:t>
+            </a:r>
+            <a:r>
+              <a:rPr lang="pt-BR" dirty="0"/>
+              <a:t>);</a:t>
+            </a:r>
+          </a:p>
+          <a:p>
+            <a:r>
+              <a:rPr lang="pt-BR" dirty="0"/>
+              <a:t> 	 </a:t>
+            </a:r>
+            <a:r>
+              <a:rPr lang="pt-BR" dirty="0" err="1"/>
+              <a:t>System.out.</a:t>
+            </a:r>
+            <a:r>
+              <a:rPr lang="pt-BR" dirty="0" err="1">
+                <a:solidFill>
+                  <a:srgbClr val="7030A0"/>
+                </a:solidFill>
+              </a:rPr>
+              <a:t>printIn</a:t>
+            </a:r>
+            <a:r>
+              <a:rPr lang="pt-BR" dirty="0">
+                <a:solidFill>
+                  <a:srgbClr val="0070C0"/>
+                </a:solidFill>
+              </a:rPr>
+              <a:t>(“Velocidade” </a:t>
+            </a:r>
+            <a:r>
+              <a:rPr lang="pt-BR" dirty="0"/>
+              <a:t>+ </a:t>
+            </a:r>
+            <a:r>
+              <a:rPr lang="pt-BR" dirty="0" err="1"/>
+              <a:t>this.velocidade</a:t>
+            </a:r>
+            <a:r>
+              <a:rPr lang="pt-BR" dirty="0"/>
+              <a:t>);</a:t>
+            </a:r>
+          </a:p>
+          <a:p>
+            <a:r>
+              <a:rPr lang="pt-BR" dirty="0"/>
+              <a:t>} </a:t>
+            </a:r>
+            <a:endParaRPr lang="pt-BR" i="1" dirty="0"/>
+          </a:p>
+          <a:p>
+            <a:endParaRPr lang="pt-BR" dirty="0"/>
+          </a:p>
+          <a:p>
+            <a:r>
+              <a:rPr lang="pt-BR" dirty="0"/>
+              <a:t> </a:t>
+            </a:r>
+          </a:p>
+        </p:txBody>
+      </p:sp>
+    </p:spTree>
+    <p:extLst>
+      <p:ext uri="{BB962C8B-B14F-4D97-AF65-F5344CB8AC3E}">
+        <p14:creationId xmlns:p14="http://schemas.microsoft.com/office/powerpoint/2010/main" val="3462366051"/>
+      </p:ext>
+    </p:extLst>
+  </p:cSld>
+  <p:clrMapOvr>
+    <a:masterClrMapping/>
+  </p:clrMapOvr>
+</p:sld>
+</file>
+
+<file path=ppt/slides/slide32.xml><?xml version="1.0" encoding="utf-8"?>
+<p:sld xmlns:a="http://schemas.openxmlformats.org/drawingml/2006/main" xmlns:r="http://schemas.openxmlformats.org/officeDocument/2006/relationships" xmlns:p="http://schemas.openxmlformats.org/presentationml/2006/main">
+  <p:cSld>
+    <p:spTree>
+      <p:nvGrpSpPr>
+        <p:cNvPr id="1" name=""/>
+        <p:cNvGrpSpPr/>
+        <p:nvPr/>
+      </p:nvGrpSpPr>
+      <p:grpSpPr>
+        <a:xfrm>
+          <a:off x="0" y="0"/>
+          <a:ext cx="0" cy="0"/>
+          <a:chOff x="0" y="0"/>
+          <a:chExt cx="0" cy="0"/>
+        </a:xfrm>
+      </p:grpSpPr>
+      <p:sp>
+        <p:nvSpPr>
+          <p:cNvPr id="4" name="Título 1">
+            <a:extLst>
+              <a:ext uri="{FF2B5EF4-FFF2-40B4-BE49-F238E27FC236}">
+                <a16:creationId xmlns:a16="http://schemas.microsoft.com/office/drawing/2014/main" id="{6C39060B-FEF0-6AA5-65E9-39A732572625}"/>
+              </a:ext>
+            </a:extLst>
+          </p:cNvPr>
+          <p:cNvSpPr>
+            <a:spLocks noGrp="1"/>
+          </p:cNvSpPr>
+          <p:nvPr>
+            <p:ph type="title"/>
+          </p:nvPr>
+        </p:nvSpPr>
+        <p:spPr>
+          <a:xfrm>
+            <a:off x="1096963" y="287338"/>
+            <a:ext cx="10058400" cy="1449387"/>
+          </a:xfrm>
+        </p:spPr>
+        <p:txBody>
+          <a:bodyPr/>
+          <a:lstStyle/>
+          <a:p>
+            <a:r>
+              <a:rPr lang="pt-BR" dirty="0"/>
+              <a:t>POLIMORFISMO</a:t>
+            </a:r>
+            <a:endParaRPr lang="pt-BR" sz="2400" dirty="0"/>
+          </a:p>
+        </p:txBody>
+      </p:sp>
+      <p:sp>
+        <p:nvSpPr>
+          <p:cNvPr id="31" name="Espaço Reservado para Conteúdo 2">
+            <a:extLst>
+              <a:ext uri="{FF2B5EF4-FFF2-40B4-BE49-F238E27FC236}">
+                <a16:creationId xmlns:a16="http://schemas.microsoft.com/office/drawing/2014/main" id="{D2061234-52CD-FFAB-42EF-8F3150325C73}"/>
+              </a:ext>
+            </a:extLst>
+          </p:cNvPr>
+          <p:cNvSpPr txBox="1">
+            <a:spLocks/>
+          </p:cNvSpPr>
+          <p:nvPr/>
+        </p:nvSpPr>
+        <p:spPr>
+          <a:xfrm>
+            <a:off x="1097279" y="1845734"/>
+            <a:ext cx="10058084" cy="4023360"/>
+          </a:xfrm>
+          <a:prstGeom prst="rect">
+            <a:avLst/>
+          </a:prstGeom>
+        </p:spPr>
+        <p:txBody>
+          <a:bodyPr vert="horz" lIns="0" tIns="45720" rIns="0" bIns="45720" rtlCol="0">
+            <a:noAutofit/>
+          </a:bodyPr>
+          <a:lstStyle>
+            <a:lvl1pPr marL="91440" indent="-91440" algn="l" defTabSz="914400" rtl="0" eaLnBrk="1" latinLnBrk="0" hangingPunct="1">
+              <a:lnSpc>
+                <a:spcPct val="90000"/>
+              </a:lnSpc>
+              <a:spcBef>
+                <a:spcPts val="1200"/>
+              </a:spcBef>
+              <a:spcAft>
+                <a:spcPts val="200"/>
+              </a:spcAft>
+              <a:buClr>
+                <a:schemeClr val="accent1"/>
+              </a:buClr>
+              <a:buSzPct val="100000"/>
+              <a:buFont typeface="Calibri" panose="020F0502020204030204" pitchFamily="34" charset="0"/>
+              <a:buChar char=" "/>
+              <a:defRPr sz="2000" kern="1200">
+                <a:solidFill>
+                  <a:schemeClr val="tx1">
+                    <a:lumMod val="75000"/>
+                    <a:lumOff val="25000"/>
+                  </a:schemeClr>
+                </a:solidFill>
+                <a:latin typeface="+mn-lt"/>
+                <a:ea typeface="+mn-ea"/>
+                <a:cs typeface="+mn-cs"/>
+              </a:defRPr>
+            </a:lvl1pPr>
+            <a:lvl2pPr marL="384048" indent="-182880" algn="l" defTabSz="914400" rtl="0" eaLnBrk="1" latinLnBrk="0" hangingPunct="1">
+              <a:lnSpc>
+                <a:spcPct val="90000"/>
+              </a:lnSpc>
+              <a:spcBef>
+                <a:spcPts val="200"/>
+              </a:spcBef>
+              <a:spcAft>
+                <a:spcPts val="400"/>
+              </a:spcAft>
+              <a:buClr>
+                <a:schemeClr val="accent1"/>
+              </a:buClr>
+              <a:buFont typeface="Calibri" pitchFamily="34" charset="0"/>
+              <a:buChar char="◦"/>
+              <a:defRPr sz="1800" kern="1200">
+                <a:solidFill>
+                  <a:schemeClr val="tx1">
+                    <a:lumMod val="75000"/>
+                    <a:lumOff val="25000"/>
+                  </a:schemeClr>
+                </a:solidFill>
+                <a:latin typeface="+mn-lt"/>
+                <a:ea typeface="+mn-ea"/>
+                <a:cs typeface="+mn-cs"/>
+              </a:defRPr>
+            </a:lvl2pPr>
+            <a:lvl3pPr marL="566928" indent="-182880" algn="l" defTabSz="914400" rtl="0" eaLnBrk="1" latinLnBrk="0" hangingPunct="1">
+              <a:lnSpc>
+                <a:spcPct val="90000"/>
+              </a:lnSpc>
+              <a:spcBef>
+                <a:spcPts val="200"/>
+              </a:spcBef>
+              <a:spcAft>
+                <a:spcPts val="400"/>
+              </a:spcAft>
+              <a:buClr>
+                <a:schemeClr val="accent1"/>
+              </a:buClr>
+              <a:buFont typeface="Calibri" pitchFamily="34" charset="0"/>
+              <a:buChar char="◦"/>
+              <a:defRPr sz="1400" kern="1200">
+                <a:solidFill>
+                  <a:schemeClr val="tx1">
+                    <a:lumMod val="75000"/>
+                    <a:lumOff val="25000"/>
+                  </a:schemeClr>
+                </a:solidFill>
+                <a:latin typeface="+mn-lt"/>
+                <a:ea typeface="+mn-ea"/>
+                <a:cs typeface="+mn-cs"/>
+              </a:defRPr>
+            </a:lvl3pPr>
+            <a:lvl4pPr marL="749808" indent="-182880" algn="l" defTabSz="914400" rtl="0" eaLnBrk="1" latinLnBrk="0" hangingPunct="1">
+              <a:lnSpc>
+                <a:spcPct val="90000"/>
+              </a:lnSpc>
+              <a:spcBef>
+                <a:spcPts val="200"/>
+              </a:spcBef>
+              <a:spcAft>
+                <a:spcPts val="400"/>
+              </a:spcAft>
+              <a:buClr>
+                <a:schemeClr val="accent1"/>
+              </a:buClr>
+              <a:buFont typeface="Calibri" pitchFamily="34" charset="0"/>
+              <a:buChar char="◦"/>
+              <a:defRPr sz="1400" kern="1200">
+                <a:solidFill>
+                  <a:schemeClr val="tx1">
+                    <a:lumMod val="75000"/>
+                    <a:lumOff val="25000"/>
+                  </a:schemeClr>
+                </a:solidFill>
+                <a:latin typeface="+mn-lt"/>
+                <a:ea typeface="+mn-ea"/>
+                <a:cs typeface="+mn-cs"/>
+              </a:defRPr>
+            </a:lvl4pPr>
+            <a:lvl5pPr marL="932688" indent="-182880" algn="l" defTabSz="914400" rtl="0" eaLnBrk="1" latinLnBrk="0" hangingPunct="1">
+              <a:lnSpc>
+                <a:spcPct val="90000"/>
+              </a:lnSpc>
+              <a:spcBef>
+                <a:spcPts val="200"/>
+              </a:spcBef>
+              <a:spcAft>
+                <a:spcPts val="400"/>
+              </a:spcAft>
+              <a:buClr>
+                <a:schemeClr val="accent1"/>
+              </a:buClr>
+              <a:buFont typeface="Calibri" pitchFamily="34" charset="0"/>
+              <a:buChar char="◦"/>
+              <a:defRPr sz="1400" kern="1200">
+                <a:solidFill>
+                  <a:schemeClr val="tx1">
+                    <a:lumMod val="75000"/>
+                    <a:lumOff val="25000"/>
+                  </a:schemeClr>
+                </a:solidFill>
+                <a:latin typeface="+mn-lt"/>
+                <a:ea typeface="+mn-ea"/>
+                <a:cs typeface="+mn-cs"/>
+              </a:defRPr>
+            </a:lvl5pPr>
+            <a:lvl6pPr marL="1100000" indent="-228600" algn="l" defTabSz="914400" rtl="0" eaLnBrk="1" latinLnBrk="0" hangingPunct="1">
+              <a:lnSpc>
+                <a:spcPct val="90000"/>
+              </a:lnSpc>
+              <a:spcBef>
+                <a:spcPts val="200"/>
+              </a:spcBef>
+              <a:spcAft>
+                <a:spcPts val="400"/>
+              </a:spcAft>
+              <a:buClr>
+                <a:schemeClr val="accent1"/>
+              </a:buClr>
+              <a:buFont typeface="Calibri" pitchFamily="34" charset="0"/>
+              <a:buChar char="◦"/>
+              <a:defRPr sz="1400" kern="1200">
+                <a:solidFill>
+                  <a:schemeClr val="tx1">
+                    <a:lumMod val="75000"/>
+                    <a:lumOff val="25000"/>
+                  </a:schemeClr>
+                </a:solidFill>
+                <a:latin typeface="+mn-lt"/>
+                <a:ea typeface="+mn-ea"/>
+                <a:cs typeface="+mn-cs"/>
+              </a:defRPr>
+            </a:lvl6pPr>
+            <a:lvl7pPr marL="1300000" indent="-228600" algn="l" defTabSz="914400" rtl="0" eaLnBrk="1" latinLnBrk="0" hangingPunct="1">
+              <a:lnSpc>
+                <a:spcPct val="90000"/>
+              </a:lnSpc>
+              <a:spcBef>
+                <a:spcPts val="200"/>
+              </a:spcBef>
+              <a:spcAft>
+                <a:spcPts val="400"/>
+              </a:spcAft>
+              <a:buClr>
+                <a:schemeClr val="accent1"/>
+              </a:buClr>
+              <a:buFont typeface="Calibri" pitchFamily="34" charset="0"/>
+              <a:buChar char="◦"/>
+              <a:defRPr sz="1400" kern="1200">
+                <a:solidFill>
+                  <a:schemeClr val="tx1">
+                    <a:lumMod val="75000"/>
+                    <a:lumOff val="25000"/>
+                  </a:schemeClr>
+                </a:solidFill>
+                <a:latin typeface="+mn-lt"/>
+                <a:ea typeface="+mn-ea"/>
+                <a:cs typeface="+mn-cs"/>
+              </a:defRPr>
+            </a:lvl7pPr>
+            <a:lvl8pPr marL="1500000" indent="-228600" algn="l" defTabSz="914400" rtl="0" eaLnBrk="1" latinLnBrk="0" hangingPunct="1">
+              <a:lnSpc>
+                <a:spcPct val="90000"/>
+              </a:lnSpc>
+              <a:spcBef>
+                <a:spcPts val="200"/>
+              </a:spcBef>
+              <a:spcAft>
+                <a:spcPts val="400"/>
+              </a:spcAft>
+              <a:buClr>
+                <a:schemeClr val="accent1"/>
+              </a:buClr>
+              <a:buFont typeface="Calibri" pitchFamily="34" charset="0"/>
+              <a:buChar char="◦"/>
+              <a:defRPr sz="1400" kern="1200">
+                <a:solidFill>
+                  <a:schemeClr val="tx1">
+                    <a:lumMod val="75000"/>
+                    <a:lumOff val="25000"/>
+                  </a:schemeClr>
+                </a:solidFill>
+                <a:latin typeface="+mn-lt"/>
+                <a:ea typeface="+mn-ea"/>
+                <a:cs typeface="+mn-cs"/>
+              </a:defRPr>
+            </a:lvl8pPr>
+            <a:lvl9pPr marL="1700000" indent="-228600" algn="l" defTabSz="914400" rtl="0" eaLnBrk="1" latinLnBrk="0" hangingPunct="1">
+              <a:lnSpc>
+                <a:spcPct val="90000"/>
+              </a:lnSpc>
+              <a:spcBef>
+                <a:spcPts val="200"/>
+              </a:spcBef>
+              <a:spcAft>
+                <a:spcPts val="400"/>
+              </a:spcAft>
+              <a:buClr>
+                <a:schemeClr val="accent1"/>
+              </a:buClr>
+              <a:buFont typeface="Calibri" pitchFamily="34" charset="0"/>
+              <a:buChar char="◦"/>
+              <a:defRPr sz="1400" kern="1200">
+                <a:solidFill>
+                  <a:schemeClr val="tx1">
+                    <a:lumMod val="75000"/>
+                    <a:lumOff val="25000"/>
+                  </a:schemeClr>
+                </a:solidFill>
+                <a:latin typeface="+mn-lt"/>
+                <a:ea typeface="+mn-ea"/>
+                <a:cs typeface="+mn-cs"/>
+              </a:defRPr>
+            </a:lvl9pPr>
+          </a:lstStyle>
+          <a:p>
+            <a:r>
+              <a:rPr lang="pt-BR" dirty="0"/>
+              <a:t>Aqui temos um exemplo de sobrescrita, onde o Método </a:t>
+            </a:r>
+            <a:r>
+              <a:rPr lang="pt-BR" i="1" dirty="0"/>
+              <a:t>visualizar()</a:t>
+            </a:r>
+            <a:r>
+              <a:rPr lang="pt-BR" dirty="0"/>
+              <a:t> na Classe Automóvel está sendo implementado:</a:t>
+            </a:r>
+          </a:p>
+          <a:p>
+            <a:r>
+              <a:rPr lang="pt-BR" dirty="0">
+                <a:solidFill>
+                  <a:srgbClr val="0070C0"/>
+                </a:solidFill>
+              </a:rPr>
+              <a:t>@Override</a:t>
+            </a:r>
+          </a:p>
+          <a:p>
+            <a:r>
+              <a:rPr lang="pt-BR" dirty="0">
+                <a:solidFill>
+                  <a:srgbClr val="FF0000"/>
+                </a:solidFill>
+              </a:rPr>
+              <a:t>public</a:t>
+            </a:r>
+            <a:r>
+              <a:rPr lang="pt-BR" dirty="0"/>
+              <a:t> void visualizar() {</a:t>
+            </a:r>
+          </a:p>
+          <a:p>
+            <a:r>
+              <a:rPr lang="pt-BR" dirty="0"/>
+              <a:t> 	 </a:t>
+            </a:r>
+            <a:r>
+              <a:rPr lang="pt-BR" dirty="0">
+                <a:solidFill>
+                  <a:srgbClr val="7030A0"/>
+                </a:solidFill>
+              </a:rPr>
+              <a:t>super.visualizar();</a:t>
+            </a:r>
+          </a:p>
+          <a:p>
+            <a:r>
+              <a:rPr lang="pt-BR" dirty="0"/>
+              <a:t> 	 System.out.</a:t>
+            </a:r>
+            <a:r>
+              <a:rPr lang="pt-BR" dirty="0">
+                <a:solidFill>
+                  <a:srgbClr val="7030A0"/>
+                </a:solidFill>
+              </a:rPr>
+              <a:t>printIn</a:t>
+            </a:r>
+            <a:r>
+              <a:rPr lang="pt-BR" dirty="0">
+                <a:solidFill>
+                  <a:srgbClr val="0070C0"/>
+                </a:solidFill>
+              </a:rPr>
+              <a:t>(“Cor: ”</a:t>
+            </a:r>
+            <a:r>
+              <a:rPr lang="pt-BR" dirty="0">
+                <a:solidFill>
+                  <a:schemeClr val="bg2">
+                    <a:lumMod val="25000"/>
+                  </a:schemeClr>
+                </a:solidFill>
+              </a:rPr>
+              <a:t> </a:t>
+            </a:r>
+            <a:r>
+              <a:rPr lang="pt-BR" dirty="0"/>
+              <a:t>+ this.cor);</a:t>
+            </a:r>
+          </a:p>
+          <a:p>
+            <a:r>
+              <a:rPr lang="pt-BR" dirty="0"/>
+              <a:t> 	 System.out.</a:t>
+            </a:r>
+            <a:r>
+              <a:rPr lang="pt-BR" dirty="0">
+                <a:solidFill>
+                  <a:srgbClr val="7030A0"/>
+                </a:solidFill>
+              </a:rPr>
+              <a:t>printIn</a:t>
+            </a:r>
+            <a:r>
+              <a:rPr lang="pt-BR" dirty="0">
+                <a:solidFill>
+                  <a:srgbClr val="0070C0"/>
+                </a:solidFill>
+              </a:rPr>
+              <a:t>(“Nº de portas: ” </a:t>
+            </a:r>
+            <a:r>
+              <a:rPr lang="pt-BR" dirty="0"/>
+              <a:t>+ this.numeroPortas);</a:t>
+            </a:r>
+          </a:p>
+          <a:p>
+            <a:r>
+              <a:rPr lang="pt-BR" dirty="0"/>
+              <a:t> 	 System.out.</a:t>
+            </a:r>
+            <a:r>
+              <a:rPr lang="pt-BR" dirty="0">
+                <a:solidFill>
+                  <a:srgbClr val="7030A0"/>
+                </a:solidFill>
+              </a:rPr>
+              <a:t>printIn</a:t>
+            </a:r>
+            <a:r>
+              <a:rPr lang="pt-BR" dirty="0">
+                <a:solidFill>
+                  <a:srgbClr val="0070C0"/>
+                </a:solidFill>
+              </a:rPr>
+              <a:t>(“Placa: ”</a:t>
+            </a:r>
+            <a:r>
+              <a:rPr lang="pt-BR" dirty="0">
+                <a:solidFill>
+                  <a:schemeClr val="bg2">
+                    <a:lumMod val="25000"/>
+                  </a:schemeClr>
+                </a:solidFill>
+              </a:rPr>
+              <a:t> </a:t>
+            </a:r>
+            <a:r>
+              <a:rPr lang="pt-BR" dirty="0"/>
+              <a:t>+ this.placa);</a:t>
+            </a:r>
+          </a:p>
+          <a:p>
+            <a:r>
+              <a:rPr lang="pt-BR" dirty="0"/>
+              <a:t> 	 System.out.</a:t>
+            </a:r>
+            <a:r>
+              <a:rPr lang="pt-BR" dirty="0">
+                <a:solidFill>
+                  <a:srgbClr val="7030A0"/>
+                </a:solidFill>
+              </a:rPr>
+              <a:t>printIn</a:t>
+            </a:r>
+            <a:r>
+              <a:rPr lang="pt-BR" dirty="0">
+                <a:solidFill>
+                  <a:srgbClr val="0070C0"/>
+                </a:solidFill>
+              </a:rPr>
+              <a:t>(“Marcha: ”</a:t>
+            </a:r>
+            <a:r>
+              <a:rPr lang="pt-BR" dirty="0">
+                <a:solidFill>
+                  <a:schemeClr val="bg2">
+                    <a:lumMod val="25000"/>
+                  </a:schemeClr>
+                </a:solidFill>
+              </a:rPr>
+              <a:t> </a:t>
+            </a:r>
+            <a:r>
+              <a:rPr lang="pt-BR" dirty="0"/>
+              <a:t>+ this.marcha);</a:t>
+            </a:r>
+          </a:p>
+          <a:p>
+            <a:r>
+              <a:rPr lang="pt-BR" dirty="0"/>
+              <a:t>} </a:t>
+            </a:r>
+            <a:endParaRPr lang="pt-BR" i="1" dirty="0"/>
+          </a:p>
+        </p:txBody>
+      </p:sp>
+    </p:spTree>
+    <p:extLst>
+      <p:ext uri="{BB962C8B-B14F-4D97-AF65-F5344CB8AC3E}">
+        <p14:creationId xmlns:p14="http://schemas.microsoft.com/office/powerpoint/2010/main" val="560967922"/>
+      </p:ext>
+    </p:extLst>
+  </p:cSld>
+  <p:clrMapOvr>
+    <a:masterClrMapping/>
+  </p:clrMapOvr>
+</p:sld>
+</file>
+
+<file path=ppt/slides/slide33.xml><?xml version="1.0" encoding="utf-8"?>
+<p:sld xmlns:a="http://schemas.openxmlformats.org/drawingml/2006/main" xmlns:r="http://schemas.openxmlformats.org/officeDocument/2006/relationships" xmlns:p="http://schemas.openxmlformats.org/presentationml/2006/main">
+  <p:cSld>
+    <p:spTree>
+      <p:nvGrpSpPr>
+        <p:cNvPr id="1" name=""/>
+        <p:cNvGrpSpPr/>
+        <p:nvPr/>
+      </p:nvGrpSpPr>
+      <p:grpSpPr>
+        <a:xfrm>
+          <a:off x="0" y="0"/>
+          <a:ext cx="0" cy="0"/>
+          <a:chOff x="0" y="0"/>
+          <a:chExt cx="0" cy="0"/>
+        </a:xfrm>
+      </p:grpSpPr>
+      <p:sp>
+        <p:nvSpPr>
+          <p:cNvPr id="4" name="Título 1">
+            <a:extLst>
+              <a:ext uri="{FF2B5EF4-FFF2-40B4-BE49-F238E27FC236}">
+                <a16:creationId xmlns:a16="http://schemas.microsoft.com/office/drawing/2014/main" id="{6C39060B-FEF0-6AA5-65E9-39A732572625}"/>
+              </a:ext>
+            </a:extLst>
+          </p:cNvPr>
+          <p:cNvSpPr>
+            <a:spLocks noGrp="1"/>
+          </p:cNvSpPr>
+          <p:nvPr>
+            <p:ph type="title"/>
+          </p:nvPr>
+        </p:nvSpPr>
+        <p:spPr>
+          <a:xfrm>
+            <a:off x="1096963" y="287338"/>
+            <a:ext cx="10058400" cy="1449387"/>
+          </a:xfrm>
+        </p:spPr>
+        <p:txBody>
+          <a:bodyPr/>
+          <a:lstStyle/>
+          <a:p>
+            <a:r>
+              <a:rPr lang="pt-BR" dirty="0"/>
+              <a:t>POLIMORFISMO</a:t>
+            </a:r>
+            <a:endParaRPr lang="pt-BR" sz="2400" dirty="0"/>
+          </a:p>
+        </p:txBody>
+      </p:sp>
+      <p:sp>
+        <p:nvSpPr>
+          <p:cNvPr id="31" name="Espaço Reservado para Conteúdo 2">
+            <a:extLst>
+              <a:ext uri="{FF2B5EF4-FFF2-40B4-BE49-F238E27FC236}">
+                <a16:creationId xmlns:a16="http://schemas.microsoft.com/office/drawing/2014/main" id="{D2061234-52CD-FFAB-42EF-8F3150325C73}"/>
+              </a:ext>
+            </a:extLst>
+          </p:cNvPr>
+          <p:cNvSpPr txBox="1">
+            <a:spLocks/>
+          </p:cNvSpPr>
+          <p:nvPr/>
+        </p:nvSpPr>
+        <p:spPr>
+          <a:xfrm>
+            <a:off x="1097279" y="1845734"/>
+            <a:ext cx="10058084" cy="4023360"/>
+          </a:xfrm>
+          <a:prstGeom prst="rect">
+            <a:avLst/>
+          </a:prstGeom>
+        </p:spPr>
+        <p:txBody>
+          <a:bodyPr vert="horz" lIns="0" tIns="45720" rIns="0" bIns="45720" rtlCol="0">
+            <a:noAutofit/>
+          </a:bodyPr>
+          <a:lstStyle>
+            <a:lvl1pPr marL="91440" indent="-91440" algn="l" defTabSz="914400" rtl="0" eaLnBrk="1" latinLnBrk="0" hangingPunct="1">
+              <a:lnSpc>
+                <a:spcPct val="90000"/>
+              </a:lnSpc>
+              <a:spcBef>
+                <a:spcPts val="1200"/>
+              </a:spcBef>
+              <a:spcAft>
+                <a:spcPts val="200"/>
+              </a:spcAft>
+              <a:buClr>
+                <a:schemeClr val="accent1"/>
+              </a:buClr>
+              <a:buSzPct val="100000"/>
+              <a:buFont typeface="Calibri" panose="020F0502020204030204" pitchFamily="34" charset="0"/>
+              <a:buChar char=" "/>
+              <a:defRPr sz="2000" kern="1200">
+                <a:solidFill>
+                  <a:schemeClr val="tx1">
+                    <a:lumMod val="75000"/>
+                    <a:lumOff val="25000"/>
+                  </a:schemeClr>
+                </a:solidFill>
+                <a:latin typeface="+mn-lt"/>
+                <a:ea typeface="+mn-ea"/>
+                <a:cs typeface="+mn-cs"/>
+              </a:defRPr>
+            </a:lvl1pPr>
+            <a:lvl2pPr marL="384048" indent="-182880" algn="l" defTabSz="914400" rtl="0" eaLnBrk="1" latinLnBrk="0" hangingPunct="1">
+              <a:lnSpc>
+                <a:spcPct val="90000"/>
+              </a:lnSpc>
+              <a:spcBef>
+                <a:spcPts val="200"/>
+              </a:spcBef>
+              <a:spcAft>
+                <a:spcPts val="400"/>
+              </a:spcAft>
+              <a:buClr>
+                <a:schemeClr val="accent1"/>
+              </a:buClr>
+              <a:buFont typeface="Calibri" pitchFamily="34" charset="0"/>
+              <a:buChar char="◦"/>
+              <a:defRPr sz="1800" kern="1200">
+                <a:solidFill>
+                  <a:schemeClr val="tx1">
+                    <a:lumMod val="75000"/>
+                    <a:lumOff val="25000"/>
+                  </a:schemeClr>
+                </a:solidFill>
+                <a:latin typeface="+mn-lt"/>
+                <a:ea typeface="+mn-ea"/>
+                <a:cs typeface="+mn-cs"/>
+              </a:defRPr>
+            </a:lvl2pPr>
+            <a:lvl3pPr marL="566928" indent="-182880" algn="l" defTabSz="914400" rtl="0" eaLnBrk="1" latinLnBrk="0" hangingPunct="1">
+              <a:lnSpc>
+                <a:spcPct val="90000"/>
+              </a:lnSpc>
+              <a:spcBef>
+                <a:spcPts val="200"/>
+              </a:spcBef>
+              <a:spcAft>
+                <a:spcPts val="400"/>
+              </a:spcAft>
+              <a:buClr>
+                <a:schemeClr val="accent1"/>
+              </a:buClr>
+              <a:buFont typeface="Calibri" pitchFamily="34" charset="0"/>
+              <a:buChar char="◦"/>
+              <a:defRPr sz="1400" kern="1200">
+                <a:solidFill>
+                  <a:schemeClr val="tx1">
+                    <a:lumMod val="75000"/>
+                    <a:lumOff val="25000"/>
+                  </a:schemeClr>
+                </a:solidFill>
+                <a:latin typeface="+mn-lt"/>
+                <a:ea typeface="+mn-ea"/>
+                <a:cs typeface="+mn-cs"/>
+              </a:defRPr>
+            </a:lvl3pPr>
+            <a:lvl4pPr marL="749808" indent="-182880" algn="l" defTabSz="914400" rtl="0" eaLnBrk="1" latinLnBrk="0" hangingPunct="1">
+              <a:lnSpc>
+                <a:spcPct val="90000"/>
+              </a:lnSpc>
+              <a:spcBef>
+                <a:spcPts val="200"/>
+              </a:spcBef>
+              <a:spcAft>
+                <a:spcPts val="400"/>
+              </a:spcAft>
+              <a:buClr>
+                <a:schemeClr val="accent1"/>
+              </a:buClr>
+              <a:buFont typeface="Calibri" pitchFamily="34" charset="0"/>
+              <a:buChar char="◦"/>
+              <a:defRPr sz="1400" kern="1200">
+                <a:solidFill>
+                  <a:schemeClr val="tx1">
+                    <a:lumMod val="75000"/>
+                    <a:lumOff val="25000"/>
+                  </a:schemeClr>
+                </a:solidFill>
+                <a:latin typeface="+mn-lt"/>
+                <a:ea typeface="+mn-ea"/>
+                <a:cs typeface="+mn-cs"/>
+              </a:defRPr>
+            </a:lvl4pPr>
+            <a:lvl5pPr marL="932688" indent="-182880" algn="l" defTabSz="914400" rtl="0" eaLnBrk="1" latinLnBrk="0" hangingPunct="1">
+              <a:lnSpc>
+                <a:spcPct val="90000"/>
+              </a:lnSpc>
+              <a:spcBef>
+                <a:spcPts val="200"/>
+              </a:spcBef>
+              <a:spcAft>
+                <a:spcPts val="400"/>
+              </a:spcAft>
+              <a:buClr>
+                <a:schemeClr val="accent1"/>
+              </a:buClr>
+              <a:buFont typeface="Calibri" pitchFamily="34" charset="0"/>
+              <a:buChar char="◦"/>
+              <a:defRPr sz="1400" kern="1200">
+                <a:solidFill>
+                  <a:schemeClr val="tx1">
+                    <a:lumMod val="75000"/>
+                    <a:lumOff val="25000"/>
+                  </a:schemeClr>
+                </a:solidFill>
+                <a:latin typeface="+mn-lt"/>
+                <a:ea typeface="+mn-ea"/>
+                <a:cs typeface="+mn-cs"/>
+              </a:defRPr>
+            </a:lvl5pPr>
+            <a:lvl6pPr marL="1100000" indent="-228600" algn="l" defTabSz="914400" rtl="0" eaLnBrk="1" latinLnBrk="0" hangingPunct="1">
+              <a:lnSpc>
+                <a:spcPct val="90000"/>
+              </a:lnSpc>
+              <a:spcBef>
+                <a:spcPts val="200"/>
+              </a:spcBef>
+              <a:spcAft>
+                <a:spcPts val="400"/>
+              </a:spcAft>
+              <a:buClr>
+                <a:schemeClr val="accent1"/>
+              </a:buClr>
+              <a:buFont typeface="Calibri" pitchFamily="34" charset="0"/>
+              <a:buChar char="◦"/>
+              <a:defRPr sz="1400" kern="1200">
+                <a:solidFill>
+                  <a:schemeClr val="tx1">
+                    <a:lumMod val="75000"/>
+                    <a:lumOff val="25000"/>
+                  </a:schemeClr>
+                </a:solidFill>
+                <a:latin typeface="+mn-lt"/>
+                <a:ea typeface="+mn-ea"/>
+                <a:cs typeface="+mn-cs"/>
+              </a:defRPr>
+            </a:lvl6pPr>
+            <a:lvl7pPr marL="1300000" indent="-228600" algn="l" defTabSz="914400" rtl="0" eaLnBrk="1" latinLnBrk="0" hangingPunct="1">
+              <a:lnSpc>
+                <a:spcPct val="90000"/>
+              </a:lnSpc>
+              <a:spcBef>
+                <a:spcPts val="200"/>
+              </a:spcBef>
+              <a:spcAft>
+                <a:spcPts val="400"/>
+              </a:spcAft>
+              <a:buClr>
+                <a:schemeClr val="accent1"/>
+              </a:buClr>
+              <a:buFont typeface="Calibri" pitchFamily="34" charset="0"/>
+              <a:buChar char="◦"/>
+              <a:defRPr sz="1400" kern="1200">
+                <a:solidFill>
+                  <a:schemeClr val="tx1">
+                    <a:lumMod val="75000"/>
+                    <a:lumOff val="25000"/>
+                  </a:schemeClr>
+                </a:solidFill>
+                <a:latin typeface="+mn-lt"/>
+                <a:ea typeface="+mn-ea"/>
+                <a:cs typeface="+mn-cs"/>
+              </a:defRPr>
+            </a:lvl7pPr>
+            <a:lvl8pPr marL="1500000" indent="-228600" algn="l" defTabSz="914400" rtl="0" eaLnBrk="1" latinLnBrk="0" hangingPunct="1">
+              <a:lnSpc>
+                <a:spcPct val="90000"/>
+              </a:lnSpc>
+              <a:spcBef>
+                <a:spcPts val="200"/>
+              </a:spcBef>
+              <a:spcAft>
+                <a:spcPts val="400"/>
+              </a:spcAft>
+              <a:buClr>
+                <a:schemeClr val="accent1"/>
+              </a:buClr>
+              <a:buFont typeface="Calibri" pitchFamily="34" charset="0"/>
+              <a:buChar char="◦"/>
+              <a:defRPr sz="1400" kern="1200">
+                <a:solidFill>
+                  <a:schemeClr val="tx1">
+                    <a:lumMod val="75000"/>
+                    <a:lumOff val="25000"/>
+                  </a:schemeClr>
+                </a:solidFill>
+                <a:latin typeface="+mn-lt"/>
+                <a:ea typeface="+mn-ea"/>
+                <a:cs typeface="+mn-cs"/>
+              </a:defRPr>
+            </a:lvl8pPr>
+            <a:lvl9pPr marL="1700000" indent="-228600" algn="l" defTabSz="914400" rtl="0" eaLnBrk="1" latinLnBrk="0" hangingPunct="1">
+              <a:lnSpc>
+                <a:spcPct val="90000"/>
+              </a:lnSpc>
+              <a:spcBef>
+                <a:spcPts val="200"/>
+              </a:spcBef>
+              <a:spcAft>
+                <a:spcPts val="400"/>
+              </a:spcAft>
+              <a:buClr>
+                <a:schemeClr val="accent1"/>
+              </a:buClr>
+              <a:buFont typeface="Calibri" pitchFamily="34" charset="0"/>
+              <a:buChar char="◦"/>
+              <a:defRPr sz="1400" kern="1200">
+                <a:solidFill>
+                  <a:schemeClr val="tx1">
+                    <a:lumMod val="75000"/>
+                    <a:lumOff val="25000"/>
+                  </a:schemeClr>
+                </a:solidFill>
+                <a:latin typeface="+mn-lt"/>
+                <a:ea typeface="+mn-ea"/>
+                <a:cs typeface="+mn-cs"/>
+              </a:defRPr>
+            </a:lvl9pPr>
+          </a:lstStyle>
+          <a:p>
+            <a:r>
+              <a:rPr lang="pt-BR" dirty="0"/>
+              <a:t>Observe que temos similaridades nas assinaturas dos 3 Métodos, mas o Método </a:t>
+            </a:r>
+            <a:r>
+              <a:rPr lang="pt-BR" i="1" dirty="0"/>
+              <a:t>visualizar()</a:t>
+            </a:r>
+            <a:r>
+              <a:rPr lang="pt-BR" dirty="0"/>
+              <a:t> está implementado de maneiras diferentes. Eles exibem os Atributos da classe herdada e seus atributos particulares.</a:t>
+            </a:r>
+          </a:p>
+          <a:p>
+            <a:r>
+              <a:rPr lang="pt-BR" dirty="0"/>
+              <a:t>O para o Método </a:t>
+            </a:r>
+            <a:r>
+              <a:rPr lang="pt-BR" i="1" dirty="0"/>
+              <a:t>visualizar()</a:t>
+            </a:r>
+            <a:r>
+              <a:rPr lang="pt-BR" dirty="0"/>
+              <a:t> funcionarem outras Classes Terrestre e Automóvel </a:t>
+            </a:r>
+            <a:r>
+              <a:rPr lang="pt-BR" b="1" dirty="0"/>
+              <a:t>foi necessário sobrescrevê-lo </a:t>
+            </a:r>
+            <a:r>
+              <a:rPr lang="pt-BR" dirty="0"/>
+              <a:t>porque as Classes Terrestre e Automóvel </a:t>
+            </a:r>
+            <a:r>
+              <a:rPr lang="pt-BR" b="1" dirty="0"/>
+              <a:t>não possuem acesso direto </a:t>
+            </a:r>
+            <a:r>
+              <a:rPr lang="pt-BR" dirty="0"/>
+              <a:t>as variáveis de criação </a:t>
+            </a:r>
+            <a:r>
+              <a:rPr lang="pt-BR" b="1" dirty="0"/>
+              <a:t>privadas</a:t>
+            </a:r>
+            <a:r>
+              <a:rPr lang="pt-BR" dirty="0"/>
+              <a:t> da </a:t>
+            </a:r>
+            <a:r>
+              <a:rPr lang="pt-BR" dirty="0" err="1"/>
+              <a:t>SuperClasse</a:t>
+            </a:r>
+            <a:r>
+              <a:rPr lang="pt-BR" dirty="0"/>
+              <a:t>. </a:t>
+            </a:r>
+          </a:p>
+          <a:p>
+            <a:r>
+              <a:rPr lang="pt-BR" dirty="0"/>
+              <a:t>Esse método não pode acessar ou alterar a variável diretamente. Uma alternativa é utilizar o Método </a:t>
+            </a:r>
+            <a:r>
+              <a:rPr lang="pt-BR" i="1" dirty="0"/>
+              <a:t>super.visualizar()</a:t>
+            </a:r>
+            <a:r>
+              <a:rPr lang="pt-BR" dirty="0"/>
+              <a:t> para receber os Atributos das Classes Herdadas.</a:t>
+            </a:r>
+          </a:p>
+        </p:txBody>
+      </p:sp>
+    </p:spTree>
+    <p:extLst>
+      <p:ext uri="{BB962C8B-B14F-4D97-AF65-F5344CB8AC3E}">
+        <p14:creationId xmlns:p14="http://schemas.microsoft.com/office/powerpoint/2010/main" val="545336921"/>
+      </p:ext>
+    </p:extLst>
+  </p:cSld>
+  <p:clrMapOvr>
+    <a:masterClrMapping/>
+  </p:clrMapOvr>
+</p:sld>
+</file>
+
+<file path=ppt/slides/slide34.xml><?xml version="1.0" encoding="utf-8"?>
+<p:sld xmlns:a="http://schemas.openxmlformats.org/drawingml/2006/main" xmlns:r="http://schemas.openxmlformats.org/officeDocument/2006/relationships" xmlns:p="http://schemas.openxmlformats.org/presentationml/2006/main">
+  <p:cSld>
+    <p:spTree>
+      <p:nvGrpSpPr>
+        <p:cNvPr id="1" name=""/>
+        <p:cNvGrpSpPr/>
+        <p:nvPr/>
+      </p:nvGrpSpPr>
+      <p:grpSpPr>
+        <a:xfrm>
+          <a:off x="0" y="0"/>
+          <a:ext cx="0" cy="0"/>
+          <a:chOff x="0" y="0"/>
+          <a:chExt cx="0" cy="0"/>
+        </a:xfrm>
+      </p:grpSpPr>
+      <p:sp>
+        <p:nvSpPr>
+          <p:cNvPr id="4" name="Título 1">
+            <a:extLst>
+              <a:ext uri="{FF2B5EF4-FFF2-40B4-BE49-F238E27FC236}">
+                <a16:creationId xmlns:a16="http://schemas.microsoft.com/office/drawing/2014/main" id="{6C39060B-FEF0-6AA5-65E9-39A732572625}"/>
+              </a:ext>
+            </a:extLst>
+          </p:cNvPr>
+          <p:cNvSpPr>
+            <a:spLocks noGrp="1"/>
+          </p:cNvSpPr>
+          <p:nvPr>
+            <p:ph type="title"/>
+          </p:nvPr>
+        </p:nvSpPr>
+        <p:spPr>
+          <a:xfrm>
+            <a:off x="1096963" y="287338"/>
+            <a:ext cx="10058400" cy="1449387"/>
+          </a:xfrm>
+        </p:spPr>
+        <p:txBody>
+          <a:bodyPr/>
+          <a:lstStyle/>
+          <a:p>
+            <a:r>
+              <a:rPr lang="pt-BR" dirty="0"/>
+              <a:t>POLIMORFISMO</a:t>
+            </a:r>
+            <a:endParaRPr lang="pt-BR" sz="2400" dirty="0"/>
+          </a:p>
+        </p:txBody>
+      </p:sp>
+      <p:sp>
+        <p:nvSpPr>
+          <p:cNvPr id="31" name="Espaço Reservado para Conteúdo 2">
+            <a:extLst>
+              <a:ext uri="{FF2B5EF4-FFF2-40B4-BE49-F238E27FC236}">
+                <a16:creationId xmlns:a16="http://schemas.microsoft.com/office/drawing/2014/main" id="{D2061234-52CD-FFAB-42EF-8F3150325C73}"/>
+              </a:ext>
+            </a:extLst>
+          </p:cNvPr>
+          <p:cNvSpPr txBox="1">
+            <a:spLocks/>
+          </p:cNvSpPr>
+          <p:nvPr/>
+        </p:nvSpPr>
+        <p:spPr>
+          <a:xfrm>
+            <a:off x="1097279" y="1845734"/>
+            <a:ext cx="10058084" cy="4023360"/>
+          </a:xfrm>
+          <a:prstGeom prst="rect">
+            <a:avLst/>
+          </a:prstGeom>
+        </p:spPr>
+        <p:txBody>
+          <a:bodyPr vert="horz" lIns="0" tIns="45720" rIns="0" bIns="45720" rtlCol="0">
+            <a:noAutofit/>
+          </a:bodyPr>
+          <a:lstStyle>
+            <a:lvl1pPr marL="91440" indent="-91440" algn="l" defTabSz="914400" rtl="0" eaLnBrk="1" latinLnBrk="0" hangingPunct="1">
+              <a:lnSpc>
+                <a:spcPct val="90000"/>
+              </a:lnSpc>
+              <a:spcBef>
+                <a:spcPts val="1200"/>
+              </a:spcBef>
+              <a:spcAft>
+                <a:spcPts val="200"/>
+              </a:spcAft>
+              <a:buClr>
+                <a:schemeClr val="accent1"/>
+              </a:buClr>
+              <a:buSzPct val="100000"/>
+              <a:buFont typeface="Calibri" panose="020F0502020204030204" pitchFamily="34" charset="0"/>
+              <a:buChar char=" "/>
+              <a:defRPr sz="2000" kern="1200">
+                <a:solidFill>
+                  <a:schemeClr val="tx1">
+                    <a:lumMod val="75000"/>
+                    <a:lumOff val="25000"/>
+                  </a:schemeClr>
+                </a:solidFill>
+                <a:latin typeface="+mn-lt"/>
+                <a:ea typeface="+mn-ea"/>
+                <a:cs typeface="+mn-cs"/>
+              </a:defRPr>
+            </a:lvl1pPr>
+            <a:lvl2pPr marL="384048" indent="-182880" algn="l" defTabSz="914400" rtl="0" eaLnBrk="1" latinLnBrk="0" hangingPunct="1">
+              <a:lnSpc>
+                <a:spcPct val="90000"/>
+              </a:lnSpc>
+              <a:spcBef>
+                <a:spcPts val="200"/>
+              </a:spcBef>
+              <a:spcAft>
+                <a:spcPts val="400"/>
+              </a:spcAft>
+              <a:buClr>
+                <a:schemeClr val="accent1"/>
+              </a:buClr>
+              <a:buFont typeface="Calibri" pitchFamily="34" charset="0"/>
+              <a:buChar char="◦"/>
+              <a:defRPr sz="1800" kern="1200">
+                <a:solidFill>
+                  <a:schemeClr val="tx1">
+                    <a:lumMod val="75000"/>
+                    <a:lumOff val="25000"/>
+                  </a:schemeClr>
+                </a:solidFill>
+                <a:latin typeface="+mn-lt"/>
+                <a:ea typeface="+mn-ea"/>
+                <a:cs typeface="+mn-cs"/>
+              </a:defRPr>
+            </a:lvl2pPr>
+            <a:lvl3pPr marL="566928" indent="-182880" algn="l" defTabSz="914400" rtl="0" eaLnBrk="1" latinLnBrk="0" hangingPunct="1">
+              <a:lnSpc>
+                <a:spcPct val="90000"/>
+              </a:lnSpc>
+              <a:spcBef>
+                <a:spcPts val="200"/>
+              </a:spcBef>
+              <a:spcAft>
+                <a:spcPts val="400"/>
+              </a:spcAft>
+              <a:buClr>
+                <a:schemeClr val="accent1"/>
+              </a:buClr>
+              <a:buFont typeface="Calibri" pitchFamily="34" charset="0"/>
+              <a:buChar char="◦"/>
+              <a:defRPr sz="1400" kern="1200">
+                <a:solidFill>
+                  <a:schemeClr val="tx1">
+                    <a:lumMod val="75000"/>
+                    <a:lumOff val="25000"/>
+                  </a:schemeClr>
+                </a:solidFill>
+                <a:latin typeface="+mn-lt"/>
+                <a:ea typeface="+mn-ea"/>
+                <a:cs typeface="+mn-cs"/>
+              </a:defRPr>
+            </a:lvl3pPr>
+            <a:lvl4pPr marL="749808" indent="-182880" algn="l" defTabSz="914400" rtl="0" eaLnBrk="1" latinLnBrk="0" hangingPunct="1">
+              <a:lnSpc>
+                <a:spcPct val="90000"/>
+              </a:lnSpc>
+              <a:spcBef>
+                <a:spcPts val="200"/>
+              </a:spcBef>
+              <a:spcAft>
+                <a:spcPts val="400"/>
+              </a:spcAft>
+              <a:buClr>
+                <a:schemeClr val="accent1"/>
+              </a:buClr>
+              <a:buFont typeface="Calibri" pitchFamily="34" charset="0"/>
+              <a:buChar char="◦"/>
+              <a:defRPr sz="1400" kern="1200">
+                <a:solidFill>
+                  <a:schemeClr val="tx1">
+                    <a:lumMod val="75000"/>
+                    <a:lumOff val="25000"/>
+                  </a:schemeClr>
+                </a:solidFill>
+                <a:latin typeface="+mn-lt"/>
+                <a:ea typeface="+mn-ea"/>
+                <a:cs typeface="+mn-cs"/>
+              </a:defRPr>
+            </a:lvl4pPr>
+            <a:lvl5pPr marL="932688" indent="-182880" algn="l" defTabSz="914400" rtl="0" eaLnBrk="1" latinLnBrk="0" hangingPunct="1">
+              <a:lnSpc>
+                <a:spcPct val="90000"/>
+              </a:lnSpc>
+              <a:spcBef>
+                <a:spcPts val="200"/>
+              </a:spcBef>
+              <a:spcAft>
+                <a:spcPts val="400"/>
+              </a:spcAft>
+              <a:buClr>
+                <a:schemeClr val="accent1"/>
+              </a:buClr>
+              <a:buFont typeface="Calibri" pitchFamily="34" charset="0"/>
+              <a:buChar char="◦"/>
+              <a:defRPr sz="1400" kern="1200">
+                <a:solidFill>
+                  <a:schemeClr val="tx1">
+                    <a:lumMod val="75000"/>
+                    <a:lumOff val="25000"/>
+                  </a:schemeClr>
+                </a:solidFill>
+                <a:latin typeface="+mn-lt"/>
+                <a:ea typeface="+mn-ea"/>
+                <a:cs typeface="+mn-cs"/>
+              </a:defRPr>
+            </a:lvl5pPr>
+            <a:lvl6pPr marL="1100000" indent="-228600" algn="l" defTabSz="914400" rtl="0" eaLnBrk="1" latinLnBrk="0" hangingPunct="1">
+              <a:lnSpc>
+                <a:spcPct val="90000"/>
+              </a:lnSpc>
+              <a:spcBef>
+                <a:spcPts val="200"/>
+              </a:spcBef>
+              <a:spcAft>
+                <a:spcPts val="400"/>
+              </a:spcAft>
+              <a:buClr>
+                <a:schemeClr val="accent1"/>
+              </a:buClr>
+              <a:buFont typeface="Calibri" pitchFamily="34" charset="0"/>
+              <a:buChar char="◦"/>
+              <a:defRPr sz="1400" kern="1200">
+                <a:solidFill>
+                  <a:schemeClr val="tx1">
+                    <a:lumMod val="75000"/>
+                    <a:lumOff val="25000"/>
+                  </a:schemeClr>
+                </a:solidFill>
+                <a:latin typeface="+mn-lt"/>
+                <a:ea typeface="+mn-ea"/>
+                <a:cs typeface="+mn-cs"/>
+              </a:defRPr>
+            </a:lvl6pPr>
+            <a:lvl7pPr marL="1300000" indent="-228600" algn="l" defTabSz="914400" rtl="0" eaLnBrk="1" latinLnBrk="0" hangingPunct="1">
+              <a:lnSpc>
+                <a:spcPct val="90000"/>
+              </a:lnSpc>
+              <a:spcBef>
+                <a:spcPts val="200"/>
+              </a:spcBef>
+              <a:spcAft>
+                <a:spcPts val="400"/>
+              </a:spcAft>
+              <a:buClr>
+                <a:schemeClr val="accent1"/>
+              </a:buClr>
+              <a:buFont typeface="Calibri" pitchFamily="34" charset="0"/>
+              <a:buChar char="◦"/>
+              <a:defRPr sz="1400" kern="1200">
+                <a:solidFill>
+                  <a:schemeClr val="tx1">
+                    <a:lumMod val="75000"/>
+                    <a:lumOff val="25000"/>
+                  </a:schemeClr>
+                </a:solidFill>
+                <a:latin typeface="+mn-lt"/>
+                <a:ea typeface="+mn-ea"/>
+                <a:cs typeface="+mn-cs"/>
+              </a:defRPr>
+            </a:lvl7pPr>
+            <a:lvl8pPr marL="1500000" indent="-228600" algn="l" defTabSz="914400" rtl="0" eaLnBrk="1" latinLnBrk="0" hangingPunct="1">
+              <a:lnSpc>
+                <a:spcPct val="90000"/>
+              </a:lnSpc>
+              <a:spcBef>
+                <a:spcPts val="200"/>
+              </a:spcBef>
+              <a:spcAft>
+                <a:spcPts val="400"/>
+              </a:spcAft>
+              <a:buClr>
+                <a:schemeClr val="accent1"/>
+              </a:buClr>
+              <a:buFont typeface="Calibri" pitchFamily="34" charset="0"/>
+              <a:buChar char="◦"/>
+              <a:defRPr sz="1400" kern="1200">
+                <a:solidFill>
+                  <a:schemeClr val="tx1">
+                    <a:lumMod val="75000"/>
+                    <a:lumOff val="25000"/>
+                  </a:schemeClr>
+                </a:solidFill>
+                <a:latin typeface="+mn-lt"/>
+                <a:ea typeface="+mn-ea"/>
+                <a:cs typeface="+mn-cs"/>
+              </a:defRPr>
+            </a:lvl8pPr>
+            <a:lvl9pPr marL="1700000" indent="-228600" algn="l" defTabSz="914400" rtl="0" eaLnBrk="1" latinLnBrk="0" hangingPunct="1">
+              <a:lnSpc>
+                <a:spcPct val="90000"/>
+              </a:lnSpc>
+              <a:spcBef>
+                <a:spcPts val="200"/>
+              </a:spcBef>
+              <a:spcAft>
+                <a:spcPts val="400"/>
+              </a:spcAft>
+              <a:buClr>
+                <a:schemeClr val="accent1"/>
+              </a:buClr>
+              <a:buFont typeface="Calibri" pitchFamily="34" charset="0"/>
+              <a:buChar char="◦"/>
+              <a:defRPr sz="1400" kern="1200">
+                <a:solidFill>
+                  <a:schemeClr val="tx1">
+                    <a:lumMod val="75000"/>
+                    <a:lumOff val="25000"/>
+                  </a:schemeClr>
+                </a:solidFill>
+                <a:latin typeface="+mn-lt"/>
+                <a:ea typeface="+mn-ea"/>
+                <a:cs typeface="+mn-cs"/>
+              </a:defRPr>
+            </a:lvl9pPr>
+          </a:lstStyle>
+          <a:p>
+            <a:r>
+              <a:rPr lang="pt-BR" b="1" dirty="0"/>
+              <a:t>Importante</a:t>
+            </a:r>
+            <a:r>
+              <a:rPr lang="pt-BR" dirty="0"/>
+              <a:t>: um método redefinido em uma </a:t>
+            </a:r>
+            <a:r>
+              <a:rPr lang="pt-BR" dirty="0" err="1"/>
+              <a:t>SubClasse</a:t>
+            </a:r>
+            <a:r>
+              <a:rPr lang="pt-BR" dirty="0"/>
+              <a:t> (B) com os mesmo </a:t>
+            </a:r>
+            <a:r>
+              <a:rPr lang="pt-BR" i="1" dirty="0"/>
+              <a:t>nome </a:t>
+            </a:r>
+            <a:r>
+              <a:rPr lang="pt-BR" dirty="0"/>
+              <a:t>e </a:t>
+            </a:r>
+            <a:r>
+              <a:rPr lang="pt-BR" i="1" dirty="0"/>
+              <a:t>parâmetro</a:t>
+            </a:r>
+            <a:r>
+              <a:rPr lang="pt-BR" dirty="0"/>
+              <a:t> do método da classe antecessora (A) automaticamente oculta o método da classe ancestral a partir da subclasse.</a:t>
+            </a:r>
+          </a:p>
+          <a:p>
+            <a:endParaRPr lang="pt-BR" dirty="0"/>
+          </a:p>
+          <a:p>
+            <a:endParaRPr lang="pt-BR" dirty="0"/>
+          </a:p>
+          <a:p>
+            <a:endParaRPr lang="pt-BR" dirty="0"/>
+          </a:p>
+          <a:p>
+            <a:endParaRPr lang="pt-BR" dirty="0"/>
+          </a:p>
+          <a:p>
+            <a:r>
+              <a:rPr lang="pt-BR" dirty="0"/>
+              <a:t>O </a:t>
+            </a:r>
+            <a:r>
+              <a:rPr lang="pt-BR" i="1" dirty="0"/>
+              <a:t>metodo1()</a:t>
+            </a:r>
+            <a:r>
+              <a:rPr lang="pt-BR" dirty="0"/>
+              <a:t> da </a:t>
+            </a:r>
+            <a:r>
+              <a:rPr lang="pt-BR" dirty="0" err="1"/>
+              <a:t>SuperClasse</a:t>
+            </a:r>
+            <a:r>
+              <a:rPr lang="pt-BR" dirty="0"/>
+              <a:t> A está presente na </a:t>
+            </a:r>
+            <a:r>
+              <a:rPr lang="pt-BR" dirty="0" err="1"/>
+              <a:t>SubClasse</a:t>
+            </a:r>
+            <a:r>
+              <a:rPr lang="pt-BR" dirty="0"/>
+              <a:t> B, mas ele sofreu alteração. Com isso, o método configurado na </a:t>
+            </a:r>
+            <a:r>
+              <a:rPr lang="pt-BR" dirty="0" err="1"/>
+              <a:t>SubClasse</a:t>
+            </a:r>
+            <a:r>
+              <a:rPr lang="pt-BR" dirty="0"/>
+              <a:t> B oculta o método da </a:t>
+            </a:r>
+            <a:r>
+              <a:rPr lang="pt-BR" dirty="0" err="1"/>
+              <a:t>SuperClasse</a:t>
+            </a:r>
+            <a:r>
+              <a:rPr lang="pt-BR" dirty="0"/>
+              <a:t> A.</a:t>
+            </a:r>
+            <a:endParaRPr lang="pt-BR" i="1" dirty="0"/>
+          </a:p>
+          <a:p>
+            <a:endParaRPr lang="pt-BR" i="1" dirty="0"/>
+          </a:p>
+        </p:txBody>
+      </p:sp>
+      <p:sp>
+        <p:nvSpPr>
+          <p:cNvPr id="2" name="Retângulo 1">
+            <a:extLst>
+              <a:ext uri="{FF2B5EF4-FFF2-40B4-BE49-F238E27FC236}">
+                <a16:creationId xmlns:a16="http://schemas.microsoft.com/office/drawing/2014/main" id="{2499ED3F-0EEA-9176-7531-EDBA1CCABFCD}"/>
+              </a:ext>
+            </a:extLst>
+          </p:cNvPr>
+          <p:cNvSpPr/>
+          <p:nvPr/>
+        </p:nvSpPr>
+        <p:spPr>
+          <a:xfrm>
+            <a:off x="1169956" y="3125894"/>
+            <a:ext cx="2596896" cy="1463040"/>
+          </a:xfrm>
+          <a:prstGeom prst="rect">
+            <a:avLst/>
+          </a:prstGeom>
+        </p:spPr>
+        <p:style>
+          <a:lnRef idx="2">
+            <a:schemeClr val="accent1">
+              <a:shade val="15000"/>
+            </a:schemeClr>
+          </a:lnRef>
+          <a:fillRef idx="1">
+            <a:schemeClr val="accent1"/>
+          </a:fillRef>
+          <a:effectRef idx="0">
+            <a:schemeClr val="accent1"/>
+          </a:effectRef>
+          <a:fontRef idx="minor">
+            <a:schemeClr val="lt1"/>
+          </a:fontRef>
+        </p:style>
+        <p:txBody>
+          <a:bodyPr rtlCol="0" anchor="ctr"/>
+          <a:lstStyle/>
+          <a:p>
+            <a:pPr algn="ctr"/>
+            <a:r>
+              <a:rPr lang="pt-BR" b="1" dirty="0">
+                <a:solidFill>
+                  <a:schemeClr val="tx1">
+                    <a:lumMod val="75000"/>
+                    <a:lumOff val="25000"/>
+                  </a:schemeClr>
+                </a:solidFill>
+              </a:rPr>
+              <a:t>CLASSE A</a:t>
+            </a:r>
+          </a:p>
+          <a:p>
+            <a:pPr algn="ctr"/>
+            <a:endParaRPr lang="pt-BR" b="1" dirty="0">
+              <a:solidFill>
+                <a:schemeClr val="tx1">
+                  <a:lumMod val="75000"/>
+                  <a:lumOff val="25000"/>
+                </a:schemeClr>
+              </a:solidFill>
+            </a:endParaRPr>
+          </a:p>
+          <a:p>
+            <a:r>
+              <a:rPr lang="pt-BR" dirty="0">
+                <a:solidFill>
+                  <a:schemeClr val="tx1">
+                    <a:lumMod val="75000"/>
+                    <a:lumOff val="25000"/>
+                  </a:schemeClr>
+                </a:solidFill>
+              </a:rPr>
+              <a:t>Método</a:t>
+            </a:r>
+            <a:r>
+              <a:rPr lang="pt-BR" b="1" dirty="0">
+                <a:solidFill>
+                  <a:schemeClr val="tx1">
+                    <a:lumMod val="75000"/>
+                    <a:lumOff val="25000"/>
+                  </a:schemeClr>
+                </a:solidFill>
+              </a:rPr>
+              <a:t>1</a:t>
+            </a:r>
+            <a:r>
+              <a:rPr lang="pt-BR" dirty="0">
+                <a:solidFill>
+                  <a:schemeClr val="tx1">
+                    <a:lumMod val="75000"/>
+                    <a:lumOff val="25000"/>
+                  </a:schemeClr>
+                </a:solidFill>
+              </a:rPr>
+              <a:t>(A, B, C){</a:t>
+            </a:r>
+          </a:p>
+          <a:p>
+            <a:r>
+              <a:rPr lang="pt-BR" dirty="0">
+                <a:solidFill>
+                  <a:schemeClr val="tx1">
+                    <a:lumMod val="75000"/>
+                    <a:lumOff val="25000"/>
+                  </a:schemeClr>
+                </a:solidFill>
+              </a:rPr>
+              <a:t> 	A, B, C</a:t>
+            </a:r>
+          </a:p>
+          <a:p>
+            <a:r>
+              <a:rPr lang="pt-BR" dirty="0">
+                <a:solidFill>
+                  <a:schemeClr val="tx1">
+                    <a:lumMod val="75000"/>
+                    <a:lumOff val="25000"/>
+                  </a:schemeClr>
+                </a:solidFill>
+              </a:rPr>
+              <a:t>}</a:t>
+            </a:r>
+          </a:p>
+        </p:txBody>
+      </p:sp>
+      <p:sp>
+        <p:nvSpPr>
+          <p:cNvPr id="5" name="Retângulo 4">
+            <a:extLst>
+              <a:ext uri="{FF2B5EF4-FFF2-40B4-BE49-F238E27FC236}">
+                <a16:creationId xmlns:a16="http://schemas.microsoft.com/office/drawing/2014/main" id="{092CAEBF-4531-632B-2BE5-F37D3A98292B}"/>
+              </a:ext>
+            </a:extLst>
+          </p:cNvPr>
+          <p:cNvSpPr/>
+          <p:nvPr/>
+        </p:nvSpPr>
+        <p:spPr>
+          <a:xfrm>
+            <a:off x="8558467" y="3125894"/>
+            <a:ext cx="2596896" cy="1463040"/>
+          </a:xfrm>
+          <a:prstGeom prst="rect">
+            <a:avLst/>
+          </a:prstGeom>
+        </p:spPr>
+        <p:style>
+          <a:lnRef idx="2">
+            <a:schemeClr val="accent1">
+              <a:shade val="15000"/>
+            </a:schemeClr>
+          </a:lnRef>
+          <a:fillRef idx="1">
+            <a:schemeClr val="accent1"/>
+          </a:fillRef>
+          <a:effectRef idx="0">
+            <a:schemeClr val="accent1"/>
+          </a:effectRef>
+          <a:fontRef idx="minor">
+            <a:schemeClr val="lt1"/>
+          </a:fontRef>
+        </p:style>
+        <p:txBody>
+          <a:bodyPr rtlCol="0" anchor="ctr"/>
+          <a:lstStyle/>
+          <a:p>
+            <a:pPr algn="ctr"/>
+            <a:r>
+              <a:rPr lang="pt-BR" b="1" dirty="0">
+                <a:solidFill>
+                  <a:schemeClr val="tx1">
+                    <a:lumMod val="75000"/>
+                    <a:lumOff val="25000"/>
+                  </a:schemeClr>
+                </a:solidFill>
+              </a:rPr>
+              <a:t>CLASSE B</a:t>
+            </a:r>
+          </a:p>
+          <a:p>
+            <a:pPr algn="ctr"/>
+            <a:endParaRPr lang="pt-BR" b="1" dirty="0">
+              <a:solidFill>
+                <a:schemeClr val="tx1">
+                  <a:lumMod val="75000"/>
+                  <a:lumOff val="25000"/>
+                </a:schemeClr>
+              </a:solidFill>
+            </a:endParaRPr>
+          </a:p>
+          <a:p>
+            <a:r>
+              <a:rPr lang="pt-BR" dirty="0">
+                <a:solidFill>
+                  <a:schemeClr val="tx1">
+                    <a:lumMod val="75000"/>
+                    <a:lumOff val="25000"/>
+                  </a:schemeClr>
+                </a:solidFill>
+              </a:rPr>
+              <a:t>Método</a:t>
+            </a:r>
+            <a:r>
+              <a:rPr lang="pt-BR" b="1" dirty="0">
+                <a:solidFill>
+                  <a:schemeClr val="tx1">
+                    <a:lumMod val="75000"/>
+                    <a:lumOff val="25000"/>
+                  </a:schemeClr>
+                </a:solidFill>
+              </a:rPr>
+              <a:t>1</a:t>
+            </a:r>
+            <a:r>
+              <a:rPr lang="pt-BR" dirty="0">
+                <a:solidFill>
+                  <a:schemeClr val="tx1">
+                    <a:lumMod val="75000"/>
+                    <a:lumOff val="25000"/>
+                  </a:schemeClr>
+                </a:solidFill>
+              </a:rPr>
+              <a:t>(A, B, C, </a:t>
+            </a:r>
+            <a:r>
+              <a:rPr lang="pt-BR" dirty="0">
+                <a:solidFill>
+                  <a:srgbClr val="FF0000"/>
+                </a:solidFill>
+              </a:rPr>
+              <a:t>D</a:t>
+            </a:r>
+            <a:r>
+              <a:rPr lang="pt-BR" dirty="0">
+                <a:solidFill>
+                  <a:schemeClr val="tx1">
+                    <a:lumMod val="75000"/>
+                    <a:lumOff val="25000"/>
+                  </a:schemeClr>
+                </a:solidFill>
+              </a:rPr>
+              <a:t>){</a:t>
+            </a:r>
+          </a:p>
+          <a:p>
+            <a:r>
+              <a:rPr lang="pt-BR" dirty="0">
+                <a:solidFill>
+                  <a:schemeClr val="tx1">
+                    <a:lumMod val="75000"/>
+                    <a:lumOff val="25000"/>
+                  </a:schemeClr>
+                </a:solidFill>
+              </a:rPr>
+              <a:t> 	A, B, C, </a:t>
+            </a:r>
+            <a:r>
+              <a:rPr lang="pt-BR" dirty="0">
+                <a:solidFill>
+                  <a:srgbClr val="FF0000"/>
+                </a:solidFill>
+              </a:rPr>
+              <a:t>D</a:t>
+            </a:r>
+            <a:endParaRPr lang="pt-BR" dirty="0">
+              <a:solidFill>
+                <a:schemeClr val="tx1">
+                  <a:lumMod val="75000"/>
+                  <a:lumOff val="25000"/>
+                </a:schemeClr>
+              </a:solidFill>
+            </a:endParaRPr>
+          </a:p>
+          <a:p>
+            <a:r>
+              <a:rPr lang="pt-BR" dirty="0">
+                <a:solidFill>
+                  <a:schemeClr val="tx1">
+                    <a:lumMod val="75000"/>
+                    <a:lumOff val="25000"/>
+                  </a:schemeClr>
+                </a:solidFill>
+              </a:rPr>
+              <a:t>}</a:t>
+            </a:r>
+          </a:p>
+        </p:txBody>
+      </p:sp>
+      <p:cxnSp>
+        <p:nvCxnSpPr>
+          <p:cNvPr id="7" name="Conector de Seta Reta 6">
+            <a:extLst>
+              <a:ext uri="{FF2B5EF4-FFF2-40B4-BE49-F238E27FC236}">
+                <a16:creationId xmlns:a16="http://schemas.microsoft.com/office/drawing/2014/main" id="{286A05C2-2466-B03E-4DEF-9C24EDD82A7E}"/>
+              </a:ext>
+            </a:extLst>
+          </p:cNvPr>
+          <p:cNvCxnSpPr>
+            <a:cxnSpLocks/>
+            <a:stCxn id="2" idx="3"/>
+            <a:endCxn id="5" idx="1"/>
+          </p:cNvCxnSpPr>
+          <p:nvPr/>
+        </p:nvCxnSpPr>
+        <p:spPr>
+          <a:xfrm>
+            <a:off x="3766852" y="3857414"/>
+            <a:ext cx="4791615" cy="0"/>
+          </a:xfrm>
+          <a:prstGeom prst="straightConnector1">
+            <a:avLst/>
+          </a:prstGeom>
+          <a:ln>
+            <a:tailEnd type="triangle"/>
+          </a:ln>
+        </p:spPr>
+        <p:style>
+          <a:lnRef idx="1">
+            <a:schemeClr val="dk1"/>
+          </a:lnRef>
+          <a:fillRef idx="0">
+            <a:schemeClr val="dk1"/>
+          </a:fillRef>
+          <a:effectRef idx="0">
+            <a:schemeClr val="dk1"/>
+          </a:effectRef>
+          <a:fontRef idx="minor">
+            <a:schemeClr val="tx1"/>
+          </a:fontRef>
+        </p:style>
+      </p:cxnSp>
+    </p:spTree>
+    <p:extLst>
+      <p:ext uri="{BB962C8B-B14F-4D97-AF65-F5344CB8AC3E}">
+        <p14:creationId xmlns:p14="http://schemas.microsoft.com/office/powerpoint/2010/main" val="3902633804"/>
+      </p:ext>
+    </p:extLst>
+  </p:cSld>
+  <p:clrMapOvr>
+    <a:masterClrMapping/>
+  </p:clrMapOvr>
+</p:sld>
+</file>
+
+<file path=ppt/slides/slide35.xml><?xml version="1.0" encoding="utf-8"?>
+<p:sld xmlns:a="http://schemas.openxmlformats.org/drawingml/2006/main" xmlns:r="http://schemas.openxmlformats.org/officeDocument/2006/relationships" xmlns:p="http://schemas.openxmlformats.org/presentationml/2006/main">
+  <p:cSld>
+    <p:spTree>
+      <p:nvGrpSpPr>
+        <p:cNvPr id="1" name=""/>
+        <p:cNvGrpSpPr/>
+        <p:nvPr/>
+      </p:nvGrpSpPr>
+      <p:grpSpPr>
+        <a:xfrm>
+          <a:off x="0" y="0"/>
+          <a:ext cx="0" cy="0"/>
+          <a:chOff x="0" y="0"/>
+          <a:chExt cx="0" cy="0"/>
+        </a:xfrm>
+      </p:grpSpPr>
+      <p:sp>
+        <p:nvSpPr>
+          <p:cNvPr id="2" name="Título 1">
+            <a:extLst>
+              <a:ext uri="{FF2B5EF4-FFF2-40B4-BE49-F238E27FC236}">
+                <a16:creationId xmlns:a16="http://schemas.microsoft.com/office/drawing/2014/main" id="{C918661C-2083-9C4D-73B7-20B768BAD7D9}"/>
+              </a:ext>
+            </a:extLst>
+          </p:cNvPr>
+          <p:cNvSpPr>
+            <a:spLocks noGrp="1"/>
+          </p:cNvSpPr>
+          <p:nvPr>
+            <p:ph type="title"/>
+          </p:nvPr>
+        </p:nvSpPr>
+        <p:spPr/>
+        <p:txBody>
+          <a:bodyPr/>
+          <a:lstStyle/>
+          <a:p>
+            <a:r>
+              <a:rPr lang="pt-BR" dirty="0"/>
+              <a:t>Sobreviveram?</a:t>
+            </a:r>
+          </a:p>
+        </p:txBody>
+      </p:sp>
+      <p:sp>
+        <p:nvSpPr>
+          <p:cNvPr id="3" name="Espaço Reservado para Conteúdo 2">
+            <a:extLst>
+              <a:ext uri="{FF2B5EF4-FFF2-40B4-BE49-F238E27FC236}">
+                <a16:creationId xmlns:a16="http://schemas.microsoft.com/office/drawing/2014/main" id="{AA97E504-545A-6B62-3668-64BBE4769FF6}"/>
+              </a:ext>
+            </a:extLst>
+          </p:cNvPr>
+          <p:cNvSpPr>
+            <a:spLocks noGrp="1"/>
+          </p:cNvSpPr>
+          <p:nvPr>
+            <p:ph idx="1"/>
+          </p:nvPr>
+        </p:nvSpPr>
+        <p:spPr/>
+        <p:txBody>
+          <a:bodyPr/>
+          <a:lstStyle/>
+          <a:p>
+            <a:pPr marL="0" indent="0">
+              <a:buNone/>
+            </a:pPr>
+            <a:r>
+              <a:rPr lang="pt-BR" dirty="0"/>
+              <a:t>  Atividade para hoje:</a:t>
+            </a:r>
+          </a:p>
+          <a:p>
+            <a:pPr marL="749808" lvl="1" indent="-457200">
+              <a:buFont typeface="+mj-lt"/>
+              <a:buAutoNum type="arabicPeriod"/>
+            </a:pPr>
+            <a:r>
+              <a:rPr lang="pt-BR" dirty="0"/>
+              <a:t>Buscar exemplos de como implementar a </a:t>
+            </a:r>
+            <a:r>
+              <a:rPr lang="pt-BR" b="1" dirty="0"/>
+              <a:t>Herança</a:t>
+            </a:r>
+            <a:r>
+              <a:rPr lang="pt-BR" dirty="0"/>
+              <a:t> em Java: Busque exemplos na internet e explique ao professor como esse exemplo funciona.</a:t>
+            </a:r>
+          </a:p>
+          <a:p>
+            <a:pPr marL="749808" lvl="1" indent="-457200">
+              <a:buFont typeface="+mj-lt"/>
+              <a:buAutoNum type="arabicPeriod"/>
+            </a:pPr>
+            <a:r>
+              <a:rPr lang="pt-BR" dirty="0"/>
+              <a:t>Fazer uma pesquisa sobre a anotação </a:t>
+            </a:r>
+            <a:r>
+              <a:rPr lang="pt-BR" b="1" dirty="0"/>
+              <a:t>@Override</a:t>
+            </a:r>
+            <a:r>
+              <a:rPr lang="pt-BR" dirty="0"/>
+              <a:t>: Busque o significado dessa anotação, e se o tempo permitir, procure sobre outras anotações (será importante você conhecer </a:t>
+            </a:r>
+            <a:r>
+              <a:rPr lang="pt-BR"/>
+              <a:t>outras anotações).</a:t>
+            </a:r>
+            <a:endParaRPr lang="pt-BR" dirty="0"/>
+          </a:p>
+        </p:txBody>
+      </p:sp>
+    </p:spTree>
+    <p:extLst>
+      <p:ext uri="{BB962C8B-B14F-4D97-AF65-F5344CB8AC3E}">
+        <p14:creationId xmlns:p14="http://schemas.microsoft.com/office/powerpoint/2010/main" val="1728503806"/>
+      </p:ext>
+    </p:extLst>
+  </p:cSld>
+  <p:clrMapOvr>
+    <a:masterClrMapping/>
+  </p:clrMapOvr>
+</p:sld>
+</file>
+
+<file path=ppt/slides/slide36.xml><?xml version="1.0" encoding="utf-8"?>
+<p:sld xmlns:a="http://schemas.openxmlformats.org/drawingml/2006/main" xmlns:r="http://schemas.openxmlformats.org/officeDocument/2006/relationships" xmlns:p="http://schemas.openxmlformats.org/presentationml/2006/main">
+  <p:cSld>
+    <p:spTree>
+      <p:nvGrpSpPr>
+        <p:cNvPr id="1" name=""/>
+        <p:cNvGrpSpPr/>
+        <p:nvPr/>
+      </p:nvGrpSpPr>
+      <p:grpSpPr>
+        <a:xfrm>
+          <a:off x="0" y="0"/>
+          <a:ext cx="0" cy="0"/>
+          <a:chOff x="0" y="0"/>
+          <a:chExt cx="0" cy="0"/>
+        </a:xfrm>
+      </p:grpSpPr>
+      <p:sp>
+        <p:nvSpPr>
           <p:cNvPr id="2" name="Título 1">
             <a:extLst>
               <a:ext uri="{FF2B5EF4-FFF2-40B4-BE49-F238E27FC236}">
@@ -16169,6 +19238,15 @@
               <a:rPr lang="pt-BR" dirty="0"/>
               <a:t>https://github.com/Leon4rdoalves/CookBook-Java/blob/main/10.md</a:t>
             </a:r>
+          </a:p>
+          <a:p>
+            <a:r>
+              <a:rPr lang="pt-BR" dirty="0"/>
+              <a:t>https://www.devmedia.com.br/sobrecarga-e-sobreposicao-de-metodos-em-orientacao-a-objetos/33066 </a:t>
+            </a:r>
+          </a:p>
+          <a:p>
+            <a:endParaRPr lang="pt-BR" dirty="0"/>
           </a:p>
         </p:txBody>
       </p:sp>

</xml_diff>